<commit_message>
Added cMazeMaker and powerpoint for week 2
</commit_message>
<xml_diff>
--- a/INFO6020_Graphics_2/D2D/Week_01/6020_W23_W01D1_CourseIntro.pptx
+++ b/INFO6020_Graphics_2/D2D/Week_01/6020_W23_W01D1_CourseIntro.pptx
@@ -115,7 +115,7 @@
   </p:defaultTextStyle>
   <p:extLst>
     <p:ext uri="{EFAFB233-063F-42B5-8137-9DF3F51BA10A}">
-      <p15:sldGuideLst xmlns="" xmlns:p15="http://schemas.microsoft.com/office/powerpoint/2012/main">
+      <p15:sldGuideLst xmlns:p15="http://schemas.microsoft.com/office/powerpoint/2012/main">
         <p15:guide id="1" orient="horz" pos="1620">
           <p15:clr>
             <a:srgbClr val="A4A3A4"/>
@@ -129,7 +129,7 @@
       </p15:sldGuideLst>
     </p:ext>
     <p:ext uri="{2D200454-40CA-4A62-9FC3-DE9A4176ACB9}">
-      <p15:notesGuideLst xmlns="" xmlns:p15="http://schemas.microsoft.com/office/powerpoint/2012/main">
+      <p15:notesGuideLst xmlns:p15="http://schemas.microsoft.com/office/powerpoint/2012/main">
         <p15:guide id="1" orient="horz" pos="2880">
           <p15:clr>
             <a:srgbClr val="A4A3A4"/>
@@ -229,7 +229,7 @@
             <a:fld id="{C796373C-ADE7-4794-A5C6-CF8090C1CBE1}" type="datetimeFigureOut">
               <a:rPr lang="en-CA" smtClean="0"/>
               <a:pPr/>
-              <a:t>2023-01-09</a:t>
+              <a:t>2023-01-11</a:t>
             </a:fld>
             <a:endParaRPr lang="en-CA"/>
           </a:p>
@@ -295,35 +295,35 @@
           <a:p>
             <a:pPr lvl="0"/>
             <a:r>
-              <a:rPr lang="en-US" smtClean="0"/>
+              <a:rPr lang="en-US"/>
               <a:t>Click to edit Master text styles</a:t>
             </a:r>
           </a:p>
           <a:p>
             <a:pPr lvl="1"/>
             <a:r>
-              <a:rPr lang="en-US" smtClean="0"/>
+              <a:rPr lang="en-US"/>
               <a:t>Second level</a:t>
             </a:r>
           </a:p>
           <a:p>
             <a:pPr lvl="2"/>
             <a:r>
-              <a:rPr lang="en-US" smtClean="0"/>
+              <a:rPr lang="en-US"/>
               <a:t>Third level</a:t>
             </a:r>
           </a:p>
           <a:p>
             <a:pPr lvl="3"/>
             <a:r>
-              <a:rPr lang="en-US" smtClean="0"/>
+              <a:rPr lang="en-US"/>
               <a:t>Fourth level</a:t>
             </a:r>
           </a:p>
           <a:p>
             <a:pPr lvl="4"/>
             <a:r>
-              <a:rPr lang="en-US" smtClean="0"/>
+              <a:rPr lang="en-US"/>
               <a:t>Fifth level</a:t>
             </a:r>
             <a:endParaRPr lang="en-CA"/>
@@ -599,10 +599,9 @@
           </a:lstStyle>
           <a:p>
             <a:r>
-              <a:rPr kumimoji="0" lang="en-US" smtClean="0"/>
+              <a:rPr kumimoji="0" lang="en-US"/>
               <a:t>Click to edit Master title style</a:t>
             </a:r>
-            <a:endParaRPr kumimoji="0" lang="en-US"/>
           </a:p>
         </p:txBody>
       </p:sp>
@@ -717,10 +716,9 @@
           </a:lstStyle>
           <a:p>
             <a:r>
-              <a:rPr kumimoji="0" lang="en-US" smtClean="0"/>
+              <a:rPr kumimoji="0" lang="en-US"/>
               <a:t>Click to edit Master subtitle style</a:t>
             </a:r>
-            <a:endParaRPr kumimoji="0" lang="en-US"/>
           </a:p>
         </p:txBody>
       </p:sp>
@@ -742,7 +740,7 @@
             <a:fld id="{1D8BD707-D9CF-40AE-B4C6-C98DA3205C09}" type="datetimeFigureOut">
               <a:rPr lang="en-US" smtClean="0"/>
               <a:pPr/>
-              <a:t>1/9/2023</a:t>
+              <a:t>1/11/2023</a:t>
             </a:fld>
             <a:endParaRPr lang="en-US"/>
           </a:p>
@@ -764,7 +762,7 @@
           <a:lstStyle/>
           <a:p>
             <a:r>
-              <a:rPr lang="en-US" smtClean="0"/>
+              <a:rPr lang="en-US"/>
               <a:t>mfeeney@fanshawec.ca</a:t>
             </a:r>
             <a:endParaRPr lang="en-US" dirty="0"/>
@@ -888,10 +886,9 @@
           <a:lstStyle/>
           <a:p>
             <a:r>
-              <a:rPr kumimoji="0" lang="en-US" smtClean="0"/>
+              <a:rPr kumimoji="0" lang="en-US"/>
               <a:t>Click to edit Master title style</a:t>
             </a:r>
-            <a:endParaRPr kumimoji="0" lang="en-US"/>
           </a:p>
         </p:txBody>
       </p:sp>
@@ -912,35 +909,35 @@
           <a:p>
             <a:pPr lvl="0" eaLnBrk="1" latinLnBrk="0" hangingPunct="1"/>
             <a:r>
-              <a:rPr lang="en-US" smtClean="0"/>
+              <a:rPr lang="en-US"/>
               <a:t>Click to edit Master text styles</a:t>
             </a:r>
           </a:p>
           <a:p>
             <a:pPr lvl="1" eaLnBrk="1" latinLnBrk="0" hangingPunct="1"/>
             <a:r>
-              <a:rPr lang="en-US" smtClean="0"/>
+              <a:rPr lang="en-US"/>
               <a:t>Second level</a:t>
             </a:r>
           </a:p>
           <a:p>
             <a:pPr lvl="2" eaLnBrk="1" latinLnBrk="0" hangingPunct="1"/>
             <a:r>
-              <a:rPr lang="en-US" smtClean="0"/>
+              <a:rPr lang="en-US"/>
               <a:t>Third level</a:t>
             </a:r>
           </a:p>
           <a:p>
             <a:pPr lvl="3" eaLnBrk="1" latinLnBrk="0" hangingPunct="1"/>
             <a:r>
-              <a:rPr lang="en-US" smtClean="0"/>
+              <a:rPr lang="en-US"/>
               <a:t>Fourth level</a:t>
             </a:r>
           </a:p>
           <a:p>
             <a:pPr lvl="4" eaLnBrk="1" latinLnBrk="0" hangingPunct="1"/>
             <a:r>
-              <a:rPr lang="en-US" smtClean="0"/>
+              <a:rPr lang="en-US"/>
               <a:t>Fifth level</a:t>
             </a:r>
             <a:endParaRPr kumimoji="0" lang="en-US"/>
@@ -965,7 +962,7 @@
             <a:fld id="{1D8BD707-D9CF-40AE-B4C6-C98DA3205C09}" type="datetimeFigureOut">
               <a:rPr lang="en-US" smtClean="0"/>
               <a:pPr/>
-              <a:t>1/9/2023</a:t>
+              <a:t>1/11/2023</a:t>
             </a:fld>
             <a:endParaRPr lang="en-US"/>
           </a:p>
@@ -1157,10 +1154,9 @@
           <a:lstStyle/>
           <a:p>
             <a:r>
-              <a:rPr kumimoji="0" lang="en-US" smtClean="0"/>
+              <a:rPr kumimoji="0" lang="en-US"/>
               <a:t>Click to edit Master title style</a:t>
             </a:r>
-            <a:endParaRPr kumimoji="0" lang="en-US"/>
           </a:p>
         </p:txBody>
       </p:sp>
@@ -1186,35 +1182,35 @@
           <a:p>
             <a:pPr lvl="0" eaLnBrk="1" latinLnBrk="0" hangingPunct="1"/>
             <a:r>
-              <a:rPr lang="en-US" smtClean="0"/>
+              <a:rPr lang="en-US"/>
               <a:t>Click to edit Master text styles</a:t>
             </a:r>
           </a:p>
           <a:p>
             <a:pPr lvl="1" eaLnBrk="1" latinLnBrk="0" hangingPunct="1"/>
             <a:r>
-              <a:rPr lang="en-US" smtClean="0"/>
+              <a:rPr lang="en-US"/>
               <a:t>Second level</a:t>
             </a:r>
           </a:p>
           <a:p>
             <a:pPr lvl="2" eaLnBrk="1" latinLnBrk="0" hangingPunct="1"/>
             <a:r>
-              <a:rPr lang="en-US" smtClean="0"/>
+              <a:rPr lang="en-US"/>
               <a:t>Third level</a:t>
             </a:r>
           </a:p>
           <a:p>
             <a:pPr lvl="3" eaLnBrk="1" latinLnBrk="0" hangingPunct="1"/>
             <a:r>
-              <a:rPr lang="en-US" smtClean="0"/>
+              <a:rPr lang="en-US"/>
               <a:t>Fourth level</a:t>
             </a:r>
           </a:p>
           <a:p>
             <a:pPr lvl="4" eaLnBrk="1" latinLnBrk="0" hangingPunct="1"/>
             <a:r>
-              <a:rPr lang="en-US" smtClean="0"/>
+              <a:rPr lang="en-US"/>
               <a:t>Fifth level</a:t>
             </a:r>
             <a:endParaRPr kumimoji="0" lang="en-US"/>
@@ -1239,7 +1235,7 @@
             <a:fld id="{1D8BD707-D9CF-40AE-B4C6-C98DA3205C09}" type="datetimeFigureOut">
               <a:rPr lang="en-US" smtClean="0"/>
               <a:pPr/>
-              <a:t>1/9/2023</a:t>
+              <a:t>1/11/2023</a:t>
             </a:fld>
             <a:endParaRPr lang="en-US"/>
           </a:p>
@@ -1339,10 +1335,9 @@
           <a:lstStyle/>
           <a:p>
             <a:r>
-              <a:rPr kumimoji="0" lang="en-US" smtClean="0"/>
+              <a:rPr kumimoji="0" lang="en-US"/>
               <a:t>Click to edit Master title style</a:t>
             </a:r>
-            <a:endParaRPr kumimoji="0" lang="en-US"/>
           </a:p>
         </p:txBody>
       </p:sp>
@@ -1363,35 +1358,35 @@
           <a:p>
             <a:pPr lvl="0" eaLnBrk="1" latinLnBrk="0" hangingPunct="1"/>
             <a:r>
-              <a:rPr lang="en-US" smtClean="0"/>
+              <a:rPr lang="en-US"/>
               <a:t>Click to edit Master text styles</a:t>
             </a:r>
           </a:p>
           <a:p>
             <a:pPr lvl="1" eaLnBrk="1" latinLnBrk="0" hangingPunct="1"/>
             <a:r>
-              <a:rPr lang="en-US" smtClean="0"/>
+              <a:rPr lang="en-US"/>
               <a:t>Second level</a:t>
             </a:r>
           </a:p>
           <a:p>
             <a:pPr lvl="2" eaLnBrk="1" latinLnBrk="0" hangingPunct="1"/>
             <a:r>
-              <a:rPr lang="en-US" smtClean="0"/>
+              <a:rPr lang="en-US"/>
               <a:t>Third level</a:t>
             </a:r>
           </a:p>
           <a:p>
             <a:pPr lvl="3" eaLnBrk="1" latinLnBrk="0" hangingPunct="1"/>
             <a:r>
-              <a:rPr lang="en-US" smtClean="0"/>
+              <a:rPr lang="en-US"/>
               <a:t>Fourth level</a:t>
             </a:r>
           </a:p>
           <a:p>
             <a:pPr lvl="4" eaLnBrk="1" latinLnBrk="0" hangingPunct="1"/>
             <a:r>
-              <a:rPr lang="en-US" smtClean="0"/>
+              <a:rPr lang="en-US"/>
               <a:t>Fifth level</a:t>
             </a:r>
             <a:endParaRPr kumimoji="0" lang="en-US"/>
@@ -1416,7 +1411,7 @@
             <a:fld id="{409CD64F-A5A1-4F21-A75E-AF65C33CA0D3}" type="datetimeFigureOut">
               <a:rPr lang="en-CA" smtClean="0"/>
               <a:pPr/>
-              <a:t>2023-01-09</a:t>
+              <a:t>2023-01-11</a:t>
             </a:fld>
             <a:endParaRPr lang="en-CA"/>
           </a:p>
@@ -1629,10 +1624,9 @@
           </a:lstStyle>
           <a:p>
             <a:r>
-              <a:rPr kumimoji="0" lang="en-US" smtClean="0"/>
+              <a:rPr kumimoji="0" lang="en-US"/>
               <a:t>Click to edit Master title style</a:t>
             </a:r>
-            <a:endParaRPr kumimoji="0" lang="en-US"/>
           </a:p>
         </p:txBody>
       </p:sp>
@@ -1748,7 +1742,7 @@
           <a:p>
             <a:pPr lvl="0" eaLnBrk="1" latinLnBrk="0" hangingPunct="1"/>
             <a:r>
-              <a:rPr kumimoji="0" lang="en-US" smtClean="0"/>
+              <a:rPr kumimoji="0" lang="en-US"/>
               <a:t>Click to edit Master text styles</a:t>
             </a:r>
           </a:p>
@@ -1772,7 +1766,7 @@
             <a:fld id="{1D8BD707-D9CF-40AE-B4C6-C98DA3205C09}" type="datetimeFigureOut">
               <a:rPr lang="en-US" smtClean="0"/>
               <a:pPr/>
-              <a:t>1/9/2023</a:t>
+              <a:t>1/11/2023</a:t>
             </a:fld>
             <a:endParaRPr lang="en-US"/>
           </a:p>
@@ -1862,10 +1856,9 @@
           <a:lstStyle/>
           <a:p>
             <a:r>
-              <a:rPr kumimoji="0" lang="en-US" smtClean="0"/>
+              <a:rPr kumimoji="0" lang="en-US"/>
               <a:t>Click to edit Master title style</a:t>
             </a:r>
-            <a:endParaRPr kumimoji="0" lang="en-US"/>
           </a:p>
         </p:txBody>
       </p:sp>
@@ -1920,35 +1913,35 @@
           <a:p>
             <a:pPr lvl="0" eaLnBrk="1" latinLnBrk="0" hangingPunct="1"/>
             <a:r>
-              <a:rPr lang="en-US" smtClean="0"/>
+              <a:rPr lang="en-US"/>
               <a:t>Click to edit Master text styles</a:t>
             </a:r>
           </a:p>
           <a:p>
             <a:pPr lvl="1" eaLnBrk="1" latinLnBrk="0" hangingPunct="1"/>
             <a:r>
-              <a:rPr lang="en-US" smtClean="0"/>
+              <a:rPr lang="en-US"/>
               <a:t>Second level</a:t>
             </a:r>
           </a:p>
           <a:p>
             <a:pPr lvl="2" eaLnBrk="1" latinLnBrk="0" hangingPunct="1"/>
             <a:r>
-              <a:rPr lang="en-US" smtClean="0"/>
+              <a:rPr lang="en-US"/>
               <a:t>Third level</a:t>
             </a:r>
           </a:p>
           <a:p>
             <a:pPr lvl="3" eaLnBrk="1" latinLnBrk="0" hangingPunct="1"/>
             <a:r>
-              <a:rPr lang="en-US" smtClean="0"/>
+              <a:rPr lang="en-US"/>
               <a:t>Fourth level</a:t>
             </a:r>
           </a:p>
           <a:p>
             <a:pPr lvl="4" eaLnBrk="1" latinLnBrk="0" hangingPunct="1"/>
             <a:r>
-              <a:rPr lang="en-US" smtClean="0"/>
+              <a:rPr lang="en-US"/>
               <a:t>Fifth level</a:t>
             </a:r>
             <a:endParaRPr kumimoji="0" lang="en-US"/>
@@ -2006,35 +1999,35 @@
           <a:p>
             <a:pPr lvl="0" eaLnBrk="1" latinLnBrk="0" hangingPunct="1"/>
             <a:r>
-              <a:rPr lang="en-US" smtClean="0"/>
+              <a:rPr lang="en-US"/>
               <a:t>Click to edit Master text styles</a:t>
             </a:r>
           </a:p>
           <a:p>
             <a:pPr lvl="1" eaLnBrk="1" latinLnBrk="0" hangingPunct="1"/>
             <a:r>
-              <a:rPr lang="en-US" smtClean="0"/>
+              <a:rPr lang="en-US"/>
               <a:t>Second level</a:t>
             </a:r>
           </a:p>
           <a:p>
             <a:pPr lvl="2" eaLnBrk="1" latinLnBrk="0" hangingPunct="1"/>
             <a:r>
-              <a:rPr lang="en-US" smtClean="0"/>
+              <a:rPr lang="en-US"/>
               <a:t>Third level</a:t>
             </a:r>
           </a:p>
           <a:p>
             <a:pPr lvl="3" eaLnBrk="1" latinLnBrk="0" hangingPunct="1"/>
             <a:r>
-              <a:rPr lang="en-US" smtClean="0"/>
+              <a:rPr lang="en-US"/>
               <a:t>Fourth level</a:t>
             </a:r>
           </a:p>
           <a:p>
             <a:pPr lvl="4" eaLnBrk="1" latinLnBrk="0" hangingPunct="1"/>
             <a:r>
-              <a:rPr lang="en-US" smtClean="0"/>
+              <a:rPr lang="en-US"/>
               <a:t>Fifth level</a:t>
             </a:r>
             <a:endParaRPr kumimoji="0" lang="en-US"/>
@@ -2059,7 +2052,7 @@
             <a:fld id="{1D8BD707-D9CF-40AE-B4C6-C98DA3205C09}" type="datetimeFigureOut">
               <a:rPr lang="en-US" smtClean="0"/>
               <a:pPr/>
-              <a:t>1/9/2023</a:t>
+              <a:t>1/11/2023</a:t>
             </a:fld>
             <a:endParaRPr lang="en-US"/>
           </a:p>
@@ -2154,10 +2147,9 @@
           </a:lstStyle>
           <a:p>
             <a:r>
-              <a:rPr kumimoji="0" lang="en-US" smtClean="0"/>
+              <a:rPr kumimoji="0" lang="en-US"/>
               <a:t>Click to edit Master title style</a:t>
             </a:r>
-            <a:endParaRPr kumimoji="0" lang="en-US"/>
           </a:p>
         </p:txBody>
       </p:sp>
@@ -2221,7 +2213,7 @@
           <a:p>
             <a:pPr lvl="0" eaLnBrk="1" latinLnBrk="0" hangingPunct="1"/>
             <a:r>
-              <a:rPr kumimoji="0" lang="en-US" smtClean="0"/>
+              <a:rPr kumimoji="0" lang="en-US"/>
               <a:t>Click to edit Master text styles</a:t>
             </a:r>
           </a:p>
@@ -2278,35 +2270,35 @@
           <a:p>
             <a:pPr lvl="0" eaLnBrk="1" latinLnBrk="0" hangingPunct="1"/>
             <a:r>
-              <a:rPr lang="en-US" smtClean="0"/>
+              <a:rPr lang="en-US"/>
               <a:t>Click to edit Master text styles</a:t>
             </a:r>
           </a:p>
           <a:p>
             <a:pPr lvl="1" eaLnBrk="1" latinLnBrk="0" hangingPunct="1"/>
             <a:r>
-              <a:rPr lang="en-US" smtClean="0"/>
+              <a:rPr lang="en-US"/>
               <a:t>Second level</a:t>
             </a:r>
           </a:p>
           <a:p>
             <a:pPr lvl="2" eaLnBrk="1" latinLnBrk="0" hangingPunct="1"/>
             <a:r>
-              <a:rPr lang="en-US" smtClean="0"/>
+              <a:rPr lang="en-US"/>
               <a:t>Third level</a:t>
             </a:r>
           </a:p>
           <a:p>
             <a:pPr lvl="3" eaLnBrk="1" latinLnBrk="0" hangingPunct="1"/>
             <a:r>
-              <a:rPr lang="en-US" smtClean="0"/>
+              <a:rPr lang="en-US"/>
               <a:t>Fourth level</a:t>
             </a:r>
           </a:p>
           <a:p>
             <a:pPr lvl="4" eaLnBrk="1" latinLnBrk="0" hangingPunct="1"/>
             <a:r>
-              <a:rPr lang="en-US" smtClean="0"/>
+              <a:rPr lang="en-US"/>
               <a:t>Fifth level</a:t>
             </a:r>
             <a:endParaRPr kumimoji="0" lang="en-US"/>
@@ -2373,7 +2365,7 @@
           <a:p>
             <a:pPr lvl="0" eaLnBrk="1" latinLnBrk="0" hangingPunct="1"/>
             <a:r>
-              <a:rPr kumimoji="0" lang="en-US" smtClean="0"/>
+              <a:rPr kumimoji="0" lang="en-US"/>
               <a:t>Click to edit Master text styles</a:t>
             </a:r>
           </a:p>
@@ -2430,35 +2422,35 @@
           <a:p>
             <a:pPr lvl="0" eaLnBrk="1" latinLnBrk="0" hangingPunct="1"/>
             <a:r>
-              <a:rPr lang="en-US" smtClean="0"/>
+              <a:rPr lang="en-US"/>
               <a:t>Click to edit Master text styles</a:t>
             </a:r>
           </a:p>
           <a:p>
             <a:pPr lvl="1" eaLnBrk="1" latinLnBrk="0" hangingPunct="1"/>
             <a:r>
-              <a:rPr lang="en-US" smtClean="0"/>
+              <a:rPr lang="en-US"/>
               <a:t>Second level</a:t>
             </a:r>
           </a:p>
           <a:p>
             <a:pPr lvl="2" eaLnBrk="1" latinLnBrk="0" hangingPunct="1"/>
             <a:r>
-              <a:rPr lang="en-US" smtClean="0"/>
+              <a:rPr lang="en-US"/>
               <a:t>Third level</a:t>
             </a:r>
           </a:p>
           <a:p>
             <a:pPr lvl="3" eaLnBrk="1" latinLnBrk="0" hangingPunct="1"/>
             <a:r>
-              <a:rPr lang="en-US" smtClean="0"/>
+              <a:rPr lang="en-US"/>
               <a:t>Fourth level</a:t>
             </a:r>
           </a:p>
           <a:p>
             <a:pPr lvl="4" eaLnBrk="1" latinLnBrk="0" hangingPunct="1"/>
             <a:r>
-              <a:rPr lang="en-US" smtClean="0"/>
+              <a:rPr lang="en-US"/>
               <a:t>Fifth level</a:t>
             </a:r>
             <a:endParaRPr kumimoji="0" lang="en-US"/>
@@ -2483,7 +2475,7 @@
             <a:fld id="{1D8BD707-D9CF-40AE-B4C6-C98DA3205C09}" type="datetimeFigureOut">
               <a:rPr lang="en-US" smtClean="0"/>
               <a:pPr/>
-              <a:t>1/9/2023</a:t>
+              <a:t>1/11/2023</a:t>
             </a:fld>
             <a:endParaRPr lang="en-US"/>
           </a:p>
@@ -2573,10 +2565,9 @@
           <a:lstStyle/>
           <a:p>
             <a:r>
-              <a:rPr kumimoji="0" lang="en-US" smtClean="0"/>
+              <a:rPr kumimoji="0" lang="en-US"/>
               <a:t>Click to edit Master title style</a:t>
             </a:r>
-            <a:endParaRPr kumimoji="0" lang="en-US"/>
           </a:p>
         </p:txBody>
       </p:sp>
@@ -2598,7 +2589,7 @@
             <a:fld id="{1D8BD707-D9CF-40AE-B4C6-C98DA3205C09}" type="datetimeFigureOut">
               <a:rPr lang="en-US" smtClean="0"/>
               <a:pPr/>
-              <a:t>1/9/2023</a:t>
+              <a:t>1/11/2023</a:t>
             </a:fld>
             <a:endParaRPr lang="en-US"/>
           </a:p>
@@ -2690,7 +2681,7 @@
             <a:fld id="{1D8BD707-D9CF-40AE-B4C6-C98DA3205C09}" type="datetimeFigureOut">
               <a:rPr lang="en-US" smtClean="0"/>
               <a:pPr/>
-              <a:t>1/9/2023</a:t>
+              <a:t>1/11/2023</a:t>
             </a:fld>
             <a:endParaRPr lang="en-US"/>
           </a:p>
@@ -2793,10 +2784,9 @@
           </a:lstStyle>
           <a:p>
             <a:r>
-              <a:rPr kumimoji="0" lang="en-US" smtClean="0"/>
+              <a:rPr kumimoji="0" lang="en-US"/>
               <a:t>Click to edit Master title style</a:t>
             </a:r>
-            <a:endParaRPr kumimoji="0" lang="en-US"/>
           </a:p>
         </p:txBody>
       </p:sp>
@@ -2851,35 +2841,35 @@
           <a:p>
             <a:pPr lvl="0" eaLnBrk="1" latinLnBrk="0" hangingPunct="1"/>
             <a:r>
-              <a:rPr lang="en-US" smtClean="0"/>
+              <a:rPr lang="en-US"/>
               <a:t>Click to edit Master text styles</a:t>
             </a:r>
           </a:p>
           <a:p>
             <a:pPr lvl="1" eaLnBrk="1" latinLnBrk="0" hangingPunct="1"/>
             <a:r>
-              <a:rPr lang="en-US" smtClean="0"/>
+              <a:rPr lang="en-US"/>
               <a:t>Second level</a:t>
             </a:r>
           </a:p>
           <a:p>
             <a:pPr lvl="2" eaLnBrk="1" latinLnBrk="0" hangingPunct="1"/>
             <a:r>
-              <a:rPr lang="en-US" smtClean="0"/>
+              <a:rPr lang="en-US"/>
               <a:t>Third level</a:t>
             </a:r>
           </a:p>
           <a:p>
             <a:pPr lvl="3" eaLnBrk="1" latinLnBrk="0" hangingPunct="1"/>
             <a:r>
-              <a:rPr lang="en-US" smtClean="0"/>
+              <a:rPr lang="en-US"/>
               <a:t>Fourth level</a:t>
             </a:r>
           </a:p>
           <a:p>
             <a:pPr lvl="4" eaLnBrk="1" latinLnBrk="0" hangingPunct="1"/>
             <a:r>
-              <a:rPr lang="en-US" smtClean="0"/>
+              <a:rPr lang="en-US"/>
               <a:t>Fifth level</a:t>
             </a:r>
             <a:endParaRPr kumimoji="0" lang="en-US"/>
@@ -2946,7 +2936,7 @@
           <a:p>
             <a:pPr lvl="0" eaLnBrk="1" latinLnBrk="0" hangingPunct="1"/>
             <a:r>
-              <a:rPr kumimoji="0" lang="en-US" smtClean="0"/>
+              <a:rPr kumimoji="0" lang="en-US"/>
               <a:t>Click to edit Master text styles</a:t>
             </a:r>
           </a:p>
@@ -2970,7 +2960,7 @@
             <a:fld id="{1D8BD707-D9CF-40AE-B4C6-C98DA3205C09}" type="datetimeFigureOut">
               <a:rPr lang="en-US" smtClean="0"/>
               <a:pPr/>
-              <a:t>1/9/2023</a:t>
+              <a:t>1/11/2023</a:t>
             </a:fld>
             <a:endParaRPr lang="en-US"/>
           </a:p>
@@ -3167,10 +3157,9 @@
           </a:lstStyle>
           <a:p>
             <a:r>
-              <a:rPr kumimoji="0" lang="en-US" smtClean="0"/>
+              <a:rPr kumimoji="0" lang="en-US"/>
               <a:t>Click to edit Master title style</a:t>
             </a:r>
-            <a:endParaRPr kumimoji="0" lang="en-US"/>
           </a:p>
         </p:txBody>
       </p:sp>
@@ -3238,7 +3227,7 @@
           </a:lstStyle>
           <a:p>
             <a:r>
-              <a:rPr kumimoji="0" lang="en-US" smtClean="0"/>
+              <a:rPr kumimoji="0" lang="en-US"/>
               <a:t>Click icon to add picture</a:t>
             </a:r>
             <a:endParaRPr kumimoji="0" lang="en-US" dirty="0"/>
@@ -3305,7 +3294,7 @@
           <a:p>
             <a:pPr lvl="0" eaLnBrk="1" latinLnBrk="0" hangingPunct="1"/>
             <a:r>
-              <a:rPr kumimoji="0" lang="en-US" smtClean="0"/>
+              <a:rPr kumimoji="0" lang="en-US"/>
               <a:t>Click to edit Master text styles</a:t>
             </a:r>
           </a:p>
@@ -3334,7 +3323,7 @@
             <a:fld id="{1D8BD707-D9CF-40AE-B4C6-C98DA3205C09}" type="datetimeFigureOut">
               <a:rPr lang="en-US" smtClean="0"/>
               <a:pPr/>
-              <a:t>1/9/2023</a:t>
+              <a:t>1/11/2023</a:t>
             </a:fld>
             <a:endParaRPr lang="en-US"/>
           </a:p>
@@ -3655,10 +3644,9 @@
           <a:lstStyle/>
           <a:p>
             <a:r>
-              <a:rPr kumimoji="0" lang="en-US" smtClean="0"/>
+              <a:rPr kumimoji="0" lang="en-US"/>
               <a:t>Click to edit Master title style</a:t>
             </a:r>
-            <a:endParaRPr kumimoji="0" lang="en-US"/>
           </a:p>
         </p:txBody>
       </p:sp>
@@ -3689,38 +3677,37 @@
           <a:p>
             <a:pPr lvl="0" eaLnBrk="1" latinLnBrk="0" hangingPunct="1"/>
             <a:r>
-              <a:rPr kumimoji="0" lang="en-US" smtClean="0"/>
+              <a:rPr kumimoji="0" lang="en-US"/>
               <a:t>Click to edit Master text styles</a:t>
             </a:r>
           </a:p>
           <a:p>
             <a:pPr lvl="1" eaLnBrk="1" latinLnBrk="0" hangingPunct="1"/>
             <a:r>
-              <a:rPr kumimoji="0" lang="en-US" smtClean="0"/>
+              <a:rPr kumimoji="0" lang="en-US"/>
               <a:t>Second level</a:t>
             </a:r>
           </a:p>
           <a:p>
             <a:pPr lvl="2" eaLnBrk="1" latinLnBrk="0" hangingPunct="1"/>
             <a:r>
-              <a:rPr kumimoji="0" lang="en-US" smtClean="0"/>
+              <a:rPr kumimoji="0" lang="en-US"/>
               <a:t>Third level</a:t>
             </a:r>
           </a:p>
           <a:p>
             <a:pPr lvl="3" eaLnBrk="1" latinLnBrk="0" hangingPunct="1"/>
             <a:r>
-              <a:rPr kumimoji="0" lang="en-US" smtClean="0"/>
+              <a:rPr kumimoji="0" lang="en-US"/>
               <a:t>Fourth level</a:t>
             </a:r>
           </a:p>
           <a:p>
             <a:pPr lvl="4" eaLnBrk="1" latinLnBrk="0" hangingPunct="1"/>
             <a:r>
-              <a:rPr kumimoji="0" lang="en-US" smtClean="0"/>
+              <a:rPr kumimoji="0" lang="en-US"/>
               <a:t>Fifth level</a:t>
             </a:r>
-            <a:endParaRPr kumimoji="0" lang="en-US"/>
           </a:p>
         </p:txBody>
       </p:sp>
@@ -3761,7 +3748,7 @@
             <a:fld id="{1D8BD707-D9CF-40AE-B4C6-C98DA3205C09}" type="datetimeFigureOut">
               <a:rPr lang="en-US" smtClean="0"/>
               <a:pPr/>
-              <a:t>1/9/2023</a:t>
+              <a:t>1/11/2023</a:t>
             </a:fld>
             <a:endParaRPr lang="en-US"/>
           </a:p>
@@ -4189,14 +4176,14 @@
           <a:lstStyle/>
           <a:p>
             <a:r>
-              <a:rPr lang="en-CA" dirty="0" smtClean="0"/>
+              <a:rPr lang="en-CA" dirty="0"/>
               <a:t>INFO6020 – Graphics 2</a:t>
             </a:r>
             <a:br>
-              <a:rPr lang="en-CA" dirty="0" smtClean="0"/>
+              <a:rPr lang="en-CA" dirty="0"/>
             </a:br>
             <a:r>
-              <a:rPr lang="en-CA" sz="3600" dirty="0" smtClean="0"/>
+              <a:rPr lang="en-CA" sz="3600" dirty="0"/>
               <a:t>Week 1, Day 1</a:t>
             </a:r>
             <a:endParaRPr lang="en-CA" dirty="0"/>
@@ -4230,7 +4217,7 @@
               <a:buChar char="•"/>
             </a:pPr>
             <a:r>
-              <a:rPr lang="en-CA" dirty="0" smtClean="0"/>
+              <a:rPr lang="en-CA" dirty="0"/>
               <a:t> Course Intro</a:t>
             </a:r>
           </a:p>
@@ -4241,13 +4228,6 @@
   <p:clrMapOvr>
     <a:masterClrMapping/>
   </p:clrMapOvr>
-  <p:timing>
-    <p:tnLst>
-      <p:par>
-        <p:cTn id="1" dur="indefinite" restart="never" nodeType="tmRoot"/>
-      </p:par>
-    </p:tnLst>
-  </p:timing>
 </p:sld>
 </file>
 
@@ -4287,10 +4267,10 @@
               <a:defRPr/>
             </a:pPr>
             <a:r>
-              <a:rPr lang="en-US" dirty="0" smtClean="0"/>
+              <a:rPr lang="en-US" dirty="0"/>
               <a:t>Who am I?</a:t>
             </a:r>
-            <a:endParaRPr lang="en-CA" dirty="0" smtClean="0"/>
+            <a:endParaRPr lang="en-CA" dirty="0"/>
           </a:p>
         </p:txBody>
       </p:sp>
@@ -4312,33 +4292,33 @@
           <a:lstStyle/>
           <a:p>
             <a:pPr eaLnBrk="1" hangingPunct="1"/>
-            <a:endParaRPr lang="en-US" dirty="0" smtClean="0"/>
+            <a:endParaRPr lang="en-US" dirty="0"/>
           </a:p>
           <a:p>
             <a:pPr eaLnBrk="1" hangingPunct="1"/>
             <a:r>
-              <a:rPr lang="en-US" dirty="0" smtClean="0"/>
+              <a:rPr lang="en-US" dirty="0"/>
               <a:t>Michael Feeney Jr.</a:t>
             </a:r>
           </a:p>
           <a:p>
             <a:pPr eaLnBrk="1" hangingPunct="1"/>
             <a:r>
-              <a:rPr lang="en-US" dirty="0" smtClean="0"/>
+              <a:rPr lang="en-US" dirty="0"/>
               <a:t>G3001</a:t>
             </a:r>
           </a:p>
           <a:p>
             <a:pPr eaLnBrk="1" hangingPunct="1"/>
             <a:r>
-              <a:rPr lang="en-US" dirty="0" smtClean="0"/>
+              <a:rPr lang="en-US" dirty="0"/>
               <a:t>mfeeney@fanshawec.ca</a:t>
             </a:r>
           </a:p>
           <a:p>
             <a:pPr eaLnBrk="1" hangingPunct="1"/>
             <a:r>
-              <a:rPr lang="en-US" dirty="0" smtClean="0"/>
+              <a:rPr lang="en-US" dirty="0"/>
               <a:t>mfeeney@fanshaweonline.ca (slower response)</a:t>
             </a:r>
           </a:p>
@@ -4921,10 +4901,9 @@
               <a:defRPr/>
             </a:pPr>
             <a:r>
-              <a:rPr lang="en-CA" dirty="0" smtClean="0"/>
+              <a:rPr lang="en-CA" dirty="0"/>
               <a:t>What’s this course all about?</a:t>
             </a:r>
-            <a:endParaRPr lang="en-CA" dirty="0"/>
           </a:p>
         </p:txBody>
       </p:sp>
@@ -4946,7 +4925,7 @@
           <a:lstStyle/>
           <a:p>
             <a:r>
-              <a:rPr lang="en-CA" sz="2400" dirty="0" smtClean="0"/>
+              <a:rPr lang="en-CA" sz="2400" dirty="0"/>
               <a:t>This course is a continuation of 'Graphics Level 1' exploring more advanced topics such as: bump mapping, advanced shadow generation, particle and water simulation and rendering, dynamic reflections, blur, bloom, fur and hair simulation, high-dynamic range rendering, and non-graphical programming of GPUs. </a:t>
             </a:r>
           </a:p>
@@ -5183,11 +5162,11 @@
               <a:defRPr/>
             </a:pPr>
             <a:r>
-              <a:rPr lang="en-CA" dirty="0" smtClean="0"/>
+              <a:rPr lang="en-CA" dirty="0"/>
               <a:t>Proposed schedule </a:t>
             </a:r>
             <a:r>
-              <a:rPr lang="en-CA" smtClean="0"/>
+              <a:rPr lang="en-CA"/>
               <a:t>(2023)</a:t>
             </a:r>
             <a:endParaRPr lang="en-CA" dirty="0"/>
@@ -5203,14 +5182,14 @@
           <p:nvPr>
             <p:extLst>
               <p:ext uri="{D42A27DB-BD31-4B8C-83A1-F6EECF244321}">
-                <p14:modId xmlns="" xmlns:p14="http://schemas.microsoft.com/office/powerpoint/2010/main" val="2445827809"/>
+                <p14:modId xmlns:p14="http://schemas.microsoft.com/office/powerpoint/2010/main" val="1882562227"/>
               </p:ext>
             </p:extLst>
           </p:nvPr>
         </p:nvGraphicFramePr>
         <p:xfrm>
           <a:off x="152400" y="1276350"/>
-          <a:ext cx="8686801" cy="3185177"/>
+          <a:ext cx="8686801" cy="2918828"/>
         </p:xfrm>
         <a:graphic>
           <a:graphicData uri="http://schemas.openxmlformats.org/drawingml/2006/table">
@@ -5220,14 +5199,14 @@
                 <a:gridCol w="990600">
                   <a:extLst>
                     <a:ext uri="{9D8B030D-6E8A-4147-A177-3AD203B41FA5}">
-                      <a16:colId xmlns="" xmlns:a16="http://schemas.microsoft.com/office/drawing/2014/main" val="20000"/>
+                      <a16:colId xmlns:a16="http://schemas.microsoft.com/office/drawing/2014/main" val="20000"/>
                     </a:ext>
                   </a:extLst>
                 </a:gridCol>
                 <a:gridCol w="7696201">
                   <a:extLst>
                     <a:ext uri="{9D8B030D-6E8A-4147-A177-3AD203B41FA5}">
-                      <a16:colId xmlns="" xmlns:a16="http://schemas.microsoft.com/office/drawing/2014/main" val="20001"/>
+                      <a16:colId xmlns:a16="http://schemas.microsoft.com/office/drawing/2014/main" val="20001"/>
                     </a:ext>
                   </a:extLst>
                 </a:gridCol>
@@ -5256,7 +5235,7 @@
                         <a:defRPr/>
                       </a:pPr>
                       <a:r>
-                        <a:rPr lang="en-CA" sz="1100" dirty="0" smtClean="0">
+                        <a:rPr lang="en-CA" sz="1100" dirty="0">
                           <a:latin typeface="Calibri"/>
                           <a:ea typeface="Calibri"/>
                           <a:cs typeface="Times New Roman"/>
@@ -5330,7 +5309,7 @@
                         <a:defRPr/>
                       </a:pPr>
                       <a:r>
-                        <a:rPr lang="en-CA" sz="1100" dirty="0" smtClean="0">
+                        <a:rPr lang="en-CA" sz="1100" dirty="0">
                           <a:latin typeface="Calibri"/>
                           <a:ea typeface="Calibri"/>
                           <a:cs typeface="Times New Roman"/>
@@ -5338,7 +5317,7 @@
                         <a:t>Geometry</a:t>
                       </a:r>
                       <a:r>
-                        <a:rPr lang="en-CA" sz="1100" baseline="0" dirty="0" smtClean="0">
+                        <a:rPr lang="en-CA" sz="1100" baseline="0" dirty="0">
                           <a:latin typeface="Calibri"/>
                           <a:ea typeface="Calibri"/>
                           <a:cs typeface="Times New Roman"/>
@@ -5346,7 +5325,7 @@
                         <a:t> </a:t>
                       </a:r>
                       <a:r>
-                        <a:rPr lang="en-CA" sz="1100" baseline="0" dirty="0" err="1" smtClean="0">
+                        <a:rPr lang="en-CA" sz="1100" baseline="0" dirty="0" err="1">
                           <a:latin typeface="Calibri"/>
                           <a:ea typeface="Calibri"/>
                           <a:cs typeface="Times New Roman"/>
@@ -5354,7 +5333,7 @@
                         <a:t>shader</a:t>
                       </a:r>
                       <a:r>
-                        <a:rPr lang="en-CA" sz="1100" baseline="0" dirty="0" smtClean="0">
+                        <a:rPr lang="en-CA" sz="1100" baseline="0" dirty="0">
                           <a:latin typeface="Calibri"/>
                           <a:ea typeface="Calibri"/>
                           <a:cs typeface="Times New Roman"/>
@@ -5362,7 +5341,7 @@
                         <a:t>: basics; render to </a:t>
                       </a:r>
                       <a:r>
-                        <a:rPr lang="en-CA" sz="1100" dirty="0" smtClean="0">
+                        <a:rPr lang="en-CA" sz="1100" dirty="0">
                           <a:latin typeface="Calibri"/>
                           <a:ea typeface="Calibri"/>
                           <a:cs typeface="Times New Roman"/>
@@ -5413,6 +5392,11 @@
                     </a:solidFill>
                   </a:tcPr>
                 </a:tc>
+                <a:extLst>
+                  <a:ext uri="{0D108BD9-81ED-4DB2-BD59-A6C34878D82A}">
+                    <a16:rowId xmlns:a16="http://schemas.microsoft.com/office/drawing/2014/main" val="10000"/>
+                  </a:ext>
+                </a:extLst>
               </a:tr>
               <a:tr h="154497">
                 <a:tc>
@@ -5438,7 +5422,7 @@
                         <a:defRPr/>
                       </a:pPr>
                       <a:r>
-                        <a:rPr lang="en-CA" sz="1100" dirty="0" smtClean="0">
+                        <a:rPr lang="en-CA" sz="1100" dirty="0">
                           <a:latin typeface="Calibri"/>
                           <a:ea typeface="Calibri"/>
                           <a:cs typeface="Times New Roman"/>
@@ -5512,7 +5496,7 @@
                         <a:defRPr/>
                       </a:pPr>
                       <a:r>
-                        <a:rPr lang="en-CA" sz="1100" dirty="0" smtClean="0">
+                        <a:rPr lang="en-CA" sz="1100" dirty="0">
                           <a:latin typeface="Calibri"/>
                           <a:ea typeface="Calibri"/>
                           <a:cs typeface="Times New Roman"/>
@@ -5520,7 +5504,7 @@
                         <a:t>Tessellation</a:t>
                       </a:r>
                       <a:r>
-                        <a:rPr lang="en-CA" sz="1100" baseline="0" dirty="0" smtClean="0">
+                        <a:rPr lang="en-CA" sz="1100" baseline="0" dirty="0">
                           <a:latin typeface="Calibri"/>
                           <a:ea typeface="Calibri"/>
                           <a:cs typeface="Times New Roman"/>
@@ -5528,7 +5512,7 @@
                         <a:t> </a:t>
                       </a:r>
                       <a:r>
-                        <a:rPr lang="en-CA" sz="1100" baseline="0" dirty="0" err="1" smtClean="0">
+                        <a:rPr lang="en-CA" sz="1100" baseline="0" dirty="0" err="1">
                           <a:latin typeface="Calibri"/>
                           <a:ea typeface="Calibri"/>
                           <a:cs typeface="Times New Roman"/>
@@ -5536,14 +5520,14 @@
                         <a:t>shader</a:t>
                       </a:r>
                       <a:r>
-                        <a:rPr lang="en-CA" sz="1100" baseline="0" dirty="0" smtClean="0">
+                        <a:rPr lang="en-CA" sz="1100" baseline="0" dirty="0">
                           <a:latin typeface="Calibri"/>
                           <a:ea typeface="Calibri"/>
                           <a:cs typeface="Times New Roman"/>
                         </a:rPr>
                         <a:t>: basics, LOD, and curve based tessellation</a:t>
                       </a:r>
-                      <a:endParaRPr lang="en-CA" sz="1100" dirty="0" smtClean="0">
+                      <a:endParaRPr lang="en-CA" sz="1100" dirty="0">
                         <a:latin typeface="Calibri"/>
                         <a:ea typeface="Calibri"/>
                         <a:cs typeface="Times New Roman"/>
@@ -5592,6 +5576,11 @@
                     </a:solidFill>
                   </a:tcPr>
                 </a:tc>
+                <a:extLst>
+                  <a:ext uri="{0D108BD9-81ED-4DB2-BD59-A6C34878D82A}">
+                    <a16:rowId xmlns:a16="http://schemas.microsoft.com/office/drawing/2014/main" val="10012"/>
+                  </a:ext>
+                </a:extLst>
               </a:tr>
               <a:tr h="402316">
                 <a:tc>
@@ -5617,18 +5606,13 @@
                         <a:defRPr/>
                       </a:pPr>
                       <a:r>
-                        <a:rPr lang="en-CA" sz="1100" dirty="0" smtClean="0">
+                        <a:rPr lang="en-CA" sz="1100" dirty="0">
                           <a:latin typeface="Calibri"/>
                           <a:ea typeface="Calibri"/>
                           <a:cs typeface="Times New Roman"/>
                         </a:rPr>
                         <a:t>Week 3</a:t>
                       </a:r>
-                      <a:endParaRPr lang="en-CA" sz="1100" dirty="0">
-                        <a:latin typeface="Calibri"/>
-                        <a:ea typeface="Calibri"/>
-                        <a:cs typeface="Times New Roman"/>
-                      </a:endParaRPr>
                     </a:p>
                   </a:txBody>
                   <a:tcPr marL="68580" marR="68580" marT="0" marB="0">
@@ -5687,7 +5671,7 @@
                         </a:spcAft>
                       </a:pPr>
                       <a:r>
-                        <a:rPr lang="en-CA" sz="1100" dirty="0" smtClean="0">
+                        <a:rPr lang="en-CA" sz="1100" dirty="0">
                           <a:latin typeface="Calibri"/>
                           <a:ea typeface="Calibri"/>
                           <a:cs typeface="Times New Roman"/>
@@ -5695,7 +5679,7 @@
                         <a:t>Deferred rendering,</a:t>
                       </a:r>
                       <a:r>
-                        <a:rPr lang="en-CA" sz="1100" baseline="0" dirty="0" smtClean="0">
+                        <a:rPr lang="en-CA" sz="1100" baseline="0" dirty="0">
                           <a:latin typeface="Calibri"/>
                           <a:ea typeface="Calibri"/>
                           <a:cs typeface="Times New Roman"/>
@@ -5703,7 +5687,7 @@
                         <a:t> part 1: </a:t>
                       </a:r>
                       <a:r>
-                        <a:rPr lang="en-CA" sz="1100" dirty="0" smtClean="0">
+                        <a:rPr lang="en-CA" sz="1100" dirty="0">
                           <a:latin typeface="Calibri"/>
                           <a:ea typeface="Calibri"/>
                           <a:cs typeface="Times New Roman"/>
@@ -5711,7 +5695,7 @@
                         <a:t>Basi</a:t>
                       </a:r>
                       <a:r>
-                        <a:rPr lang="en-CA" sz="1100" baseline="0" dirty="0" smtClean="0">
+                        <a:rPr lang="en-CA" sz="1100" baseline="0" dirty="0">
                           <a:latin typeface="Calibri"/>
                           <a:ea typeface="Calibri"/>
                           <a:cs typeface="Times New Roman"/>
@@ -5729,7 +5713,7 @@
                         </a:spcAft>
                       </a:pPr>
                       <a:r>
-                        <a:rPr lang="en-CA" sz="1100" dirty="0" smtClean="0">
+                        <a:rPr lang="en-CA" sz="1100" dirty="0">
                           <a:latin typeface="Calibri"/>
                           <a:ea typeface="Calibri"/>
                           <a:cs typeface="Times New Roman"/>
@@ -5737,7 +5721,7 @@
                         <a:t>- Full</a:t>
                       </a:r>
                       <a:r>
-                        <a:rPr lang="en-CA" sz="1100" baseline="0" dirty="0" smtClean="0">
+                        <a:rPr lang="en-CA" sz="1100" baseline="0" dirty="0">
                           <a:latin typeface="Calibri"/>
                           <a:ea typeface="Calibri"/>
                           <a:cs typeface="Times New Roman"/>
@@ -5795,7 +5779,7 @@
                 </a:tc>
                 <a:extLst>
                   <a:ext uri="{0D108BD9-81ED-4DB2-BD59-A6C34878D82A}">
-                    <a16:rowId xmlns="" xmlns:a16="http://schemas.microsoft.com/office/drawing/2014/main" val="10001"/>
+                    <a16:rowId xmlns:a16="http://schemas.microsoft.com/office/drawing/2014/main" val="10001"/>
                   </a:ext>
                 </a:extLst>
               </a:tr>
@@ -5823,18 +5807,13 @@
                         <a:defRPr/>
                       </a:pPr>
                       <a:r>
-                        <a:rPr lang="en-CA" sz="1100" dirty="0" smtClean="0">
+                        <a:rPr lang="en-CA" sz="1100" dirty="0">
                           <a:latin typeface="Calibri"/>
                           <a:ea typeface="Calibri"/>
                           <a:cs typeface="Times New Roman"/>
                         </a:rPr>
                         <a:t>Week 4</a:t>
                       </a:r>
-                      <a:endParaRPr lang="en-CA" sz="1100" dirty="0">
-                        <a:latin typeface="Calibri"/>
-                        <a:ea typeface="Calibri"/>
-                        <a:cs typeface="Times New Roman"/>
-                      </a:endParaRPr>
                     </a:p>
                   </a:txBody>
                   <a:tcPr marL="68580" marR="68580" marT="0" marB="0">
@@ -5893,7 +5872,7 @@
                         </a:spcAft>
                       </a:pPr>
                       <a:r>
-                        <a:rPr lang="en-CA" sz="1100" dirty="0" smtClean="0">
+                        <a:rPr lang="en-CA" sz="1100" dirty="0">
                           <a:latin typeface="Calibri"/>
                           <a:ea typeface="Calibri"/>
                           <a:cs typeface="Times New Roman"/>
@@ -5901,7 +5880,7 @@
                         <a:t>Basic</a:t>
                       </a:r>
                       <a:r>
-                        <a:rPr lang="en-CA" sz="1100" baseline="0" dirty="0" smtClean="0">
+                        <a:rPr lang="en-CA" sz="1100" baseline="0" dirty="0">
                           <a:latin typeface="Calibri"/>
                           <a:ea typeface="Calibri"/>
                           <a:cs typeface="Times New Roman"/>
@@ -5959,7 +5938,7 @@
                 </a:tc>
                 <a:extLst>
                   <a:ext uri="{0D108BD9-81ED-4DB2-BD59-A6C34878D82A}">
-                    <a16:rowId xmlns="" xmlns:a16="http://schemas.microsoft.com/office/drawing/2014/main" val="10002"/>
+                    <a16:rowId xmlns:a16="http://schemas.microsoft.com/office/drawing/2014/main" val="10002"/>
                   </a:ext>
                 </a:extLst>
               </a:tr>
@@ -5987,18 +5966,13 @@
                         <a:defRPr/>
                       </a:pPr>
                       <a:r>
-                        <a:rPr lang="en-CA" sz="1100" dirty="0" smtClean="0">
+                        <a:rPr lang="en-CA" sz="1100" dirty="0">
                           <a:latin typeface="Calibri"/>
                           <a:ea typeface="Calibri"/>
                           <a:cs typeface="Times New Roman"/>
                         </a:rPr>
                         <a:t>Week 5</a:t>
                       </a:r>
-                      <a:endParaRPr lang="en-CA" sz="1100" dirty="0">
-                        <a:latin typeface="Calibri"/>
-                        <a:ea typeface="Calibri"/>
-                        <a:cs typeface="Times New Roman"/>
-                      </a:endParaRPr>
                     </a:p>
                   </a:txBody>
                   <a:tcPr marL="68580" marR="68580" marT="0" marB="0">
@@ -6066,18 +6040,13 @@
                         <a:defRPr/>
                       </a:pPr>
                       <a:r>
-                        <a:rPr lang="en-CA" sz="1100" dirty="0" smtClean="0">
+                        <a:rPr lang="en-CA" sz="1100" dirty="0">
                           <a:latin typeface="Calibri"/>
                           <a:ea typeface="Calibri"/>
                           <a:cs typeface="Times New Roman"/>
                         </a:rPr>
                         <a:t>Deferred rendering</a:t>
                       </a:r>
-                      <a:endParaRPr lang="en-CA" sz="1100" dirty="0">
-                        <a:latin typeface="Calibri"/>
-                        <a:ea typeface="Calibri"/>
-                        <a:cs typeface="Times New Roman"/>
-                      </a:endParaRPr>
                     </a:p>
                   </a:txBody>
                   <a:tcPr marL="68580" marR="68580" marT="0" marB="0">
@@ -6124,7 +6093,7 @@
                 </a:tc>
                 <a:extLst>
                   <a:ext uri="{0D108BD9-81ED-4DB2-BD59-A6C34878D82A}">
-                    <a16:rowId xmlns="" xmlns:a16="http://schemas.microsoft.com/office/drawing/2014/main" val="10003"/>
+                    <a16:rowId xmlns:a16="http://schemas.microsoft.com/office/drawing/2014/main" val="10003"/>
                   </a:ext>
                 </a:extLst>
               </a:tr>
@@ -6152,18 +6121,13 @@
                         <a:defRPr/>
                       </a:pPr>
                       <a:r>
-                        <a:rPr lang="en-CA" sz="1100" dirty="0" smtClean="0">
+                        <a:rPr lang="en-CA" sz="1100" dirty="0">
                           <a:latin typeface="Calibri"/>
                           <a:ea typeface="Calibri"/>
                           <a:cs typeface="Times New Roman"/>
                         </a:rPr>
                         <a:t>Week 6</a:t>
                       </a:r>
-                      <a:endParaRPr lang="en-CA" sz="1100" dirty="0">
-                        <a:latin typeface="Calibri"/>
-                        <a:ea typeface="Calibri"/>
-                        <a:cs typeface="Times New Roman"/>
-                      </a:endParaRPr>
                     </a:p>
                   </a:txBody>
                   <a:tcPr marL="68580" marR="68580" marT="0" marB="0">
@@ -6231,7 +6195,7 @@
                         <a:defRPr/>
                       </a:pPr>
                       <a:r>
-                        <a:rPr lang="en-CA" sz="1100" dirty="0" smtClean="0">
+                        <a:rPr lang="en-CA" sz="1100" dirty="0">
                           <a:latin typeface="Calibri"/>
                           <a:ea typeface="Calibri"/>
                           <a:cs typeface="Times New Roman"/>
@@ -6239,14 +6203,14 @@
                         <a:t>Particulate</a:t>
                       </a:r>
                       <a:r>
-                        <a:rPr lang="en-CA" sz="1100" baseline="0" dirty="0" smtClean="0">
+                        <a:rPr lang="en-CA" sz="1100" baseline="0" dirty="0">
                           <a:latin typeface="Calibri"/>
                           <a:ea typeface="Calibri"/>
                           <a:cs typeface="Times New Roman"/>
                         </a:rPr>
                         <a:t> fog and smoke (simple and particulate)</a:t>
                       </a:r>
-                      <a:endParaRPr lang="en-CA" sz="1100" dirty="0" smtClean="0">
+                      <a:endParaRPr lang="en-CA" sz="1100" dirty="0">
                         <a:latin typeface="Calibri"/>
                         <a:ea typeface="Calibri"/>
                         <a:cs typeface="Times New Roman"/>
@@ -6297,7 +6261,7 @@
                 </a:tc>
                 <a:extLst>
                   <a:ext uri="{0D108BD9-81ED-4DB2-BD59-A6C34878D82A}">
-                    <a16:rowId xmlns="" xmlns:a16="http://schemas.microsoft.com/office/drawing/2014/main" val="10004"/>
+                    <a16:rowId xmlns:a16="http://schemas.microsoft.com/office/drawing/2014/main" val="10004"/>
                   </a:ext>
                 </a:extLst>
               </a:tr>
@@ -6325,18 +6289,13 @@
                         <a:defRPr/>
                       </a:pPr>
                       <a:r>
-                        <a:rPr lang="en-CA" sz="1100" dirty="0" smtClean="0">
+                        <a:rPr lang="en-CA" sz="1100" dirty="0">
                           <a:latin typeface="Calibri"/>
                           <a:ea typeface="Calibri"/>
                           <a:cs typeface="Times New Roman"/>
                         </a:rPr>
                         <a:t>Week 7</a:t>
                       </a:r>
-                      <a:endParaRPr lang="en-CA" sz="1100" dirty="0">
-                        <a:latin typeface="Calibri"/>
-                        <a:ea typeface="Calibri"/>
-                        <a:cs typeface="Times New Roman"/>
-                      </a:endParaRPr>
                     </a:p>
                   </a:txBody>
                   <a:tcPr marL="68580" marR="68580" marT="0" marB="0">
@@ -6404,14 +6363,14 @@
                         <a:defRPr/>
                       </a:pPr>
                       <a:r>
-                        <a:rPr lang="en-CA" sz="1100" baseline="0" dirty="0" smtClean="0">
+                        <a:rPr lang="en-CA" sz="1100" baseline="0" dirty="0">
                           <a:latin typeface="Calibri"/>
                           <a:ea typeface="Calibri"/>
                           <a:cs typeface="Times New Roman"/>
                         </a:rPr>
                         <a:t>Mid-term, Project #1</a:t>
                       </a:r>
-                      <a:endParaRPr lang="en-CA" sz="1100" dirty="0" smtClean="0">
+                      <a:endParaRPr lang="en-CA" sz="1100" dirty="0">
                         <a:latin typeface="Calibri"/>
                         <a:ea typeface="Calibri"/>
                         <a:cs typeface="Times New Roman"/>
@@ -6462,7 +6421,7 @@
                 </a:tc>
                 <a:extLst>
                   <a:ext uri="{0D108BD9-81ED-4DB2-BD59-A6C34878D82A}">
-                    <a16:rowId xmlns="" xmlns:a16="http://schemas.microsoft.com/office/drawing/2014/main" val="10005"/>
+                    <a16:rowId xmlns:a16="http://schemas.microsoft.com/office/drawing/2014/main" val="10005"/>
                   </a:ext>
                 </a:extLst>
               </a:tr>
@@ -6490,7 +6449,7 @@
                         <a:defRPr/>
                       </a:pPr>
                       <a:r>
-                        <a:rPr lang="en-CA" sz="1100" dirty="0" smtClean="0">
+                        <a:rPr lang="en-CA" sz="1100" dirty="0">
                           <a:latin typeface="Calibri"/>
                           <a:ea typeface="Calibri"/>
                           <a:cs typeface="Times New Roman"/>
@@ -6564,7 +6523,7 @@
                         <a:defRPr/>
                       </a:pPr>
                       <a:r>
-                        <a:rPr lang="en-CA" sz="1100" dirty="0" smtClean="0">
+                        <a:rPr lang="en-CA" sz="1100" dirty="0">
                           <a:latin typeface="Calibri"/>
                           <a:ea typeface="Calibri"/>
                           <a:cs typeface="Times New Roman"/>
@@ -6615,6 +6574,11 @@
                     </a:solidFill>
                   </a:tcPr>
                 </a:tc>
+                <a:extLst>
+                  <a:ext uri="{0D108BD9-81ED-4DB2-BD59-A6C34878D82A}">
+                    <a16:rowId xmlns:a16="http://schemas.microsoft.com/office/drawing/2014/main" val="10013"/>
+                  </a:ext>
+                </a:extLst>
               </a:tr>
               <a:tr h="154544">
                 <a:tc>
@@ -6640,18 +6604,13 @@
                         <a:defRPr/>
                       </a:pPr>
                       <a:r>
-                        <a:rPr lang="en-CA" sz="1100" dirty="0" smtClean="0">
+                        <a:rPr lang="en-CA" sz="1100" dirty="0">
                           <a:latin typeface="Calibri"/>
                           <a:ea typeface="Calibri"/>
                           <a:cs typeface="Times New Roman"/>
                         </a:rPr>
                         <a:t>Week 9</a:t>
                       </a:r>
-                      <a:endParaRPr lang="en-CA" sz="1100" dirty="0">
-                        <a:latin typeface="Calibri"/>
-                        <a:ea typeface="Calibri"/>
-                        <a:cs typeface="Times New Roman"/>
-                      </a:endParaRPr>
                     </a:p>
                   </a:txBody>
                   <a:tcPr marL="68580" marR="68580" marT="0" marB="0">
@@ -6719,13 +6678,26 @@
                         <a:defRPr/>
                       </a:pPr>
                       <a:r>
-                        <a:rPr lang="en-CA" sz="1100" dirty="0" smtClean="0">
+                        <a:rPr lang="en-CA" sz="1100" dirty="0">
                           <a:latin typeface="Calibri"/>
                           <a:ea typeface="Calibri"/>
                           <a:cs typeface="Times New Roman"/>
                         </a:rPr>
-                        <a:t>Stencil and scissor buffers, </a:t>
+                        <a:t>Stencil and </a:t>
                       </a:r>
+                      <a:r>
+                        <a:rPr lang="en-CA" sz="1100">
+                          <a:latin typeface="Calibri"/>
+                          <a:ea typeface="Calibri"/>
+                          <a:cs typeface="Times New Roman"/>
+                        </a:rPr>
+                        <a:t>scissor buffers</a:t>
+                      </a:r>
+                      <a:endParaRPr lang="en-CA" sz="1100" dirty="0">
+                        <a:latin typeface="Calibri"/>
+                        <a:ea typeface="Calibri"/>
+                        <a:cs typeface="Times New Roman"/>
+                      </a:endParaRPr>
                     </a:p>
                   </a:txBody>
                   <a:tcPr marL="68580" marR="68580" marT="0" marB="0">
@@ -6772,7 +6744,7 @@
                 </a:tc>
                 <a:extLst>
                   <a:ext uri="{0D108BD9-81ED-4DB2-BD59-A6C34878D82A}">
-                    <a16:rowId xmlns="" xmlns:a16="http://schemas.microsoft.com/office/drawing/2014/main" val="10006"/>
+                    <a16:rowId xmlns:a16="http://schemas.microsoft.com/office/drawing/2014/main" val="10006"/>
                   </a:ext>
                 </a:extLst>
               </a:tr>
@@ -6800,18 +6772,13 @@
                         <a:defRPr/>
                       </a:pPr>
                       <a:r>
-                        <a:rPr lang="en-CA" sz="1100" dirty="0" smtClean="0">
+                        <a:rPr lang="en-CA" sz="1100" dirty="0">
                           <a:latin typeface="Calibri"/>
                           <a:ea typeface="Calibri"/>
                           <a:cs typeface="Times New Roman"/>
                         </a:rPr>
                         <a:t>Week 10</a:t>
                       </a:r>
-                      <a:endParaRPr lang="en-CA" sz="1100" dirty="0">
-                        <a:latin typeface="Calibri"/>
-                        <a:ea typeface="Calibri"/>
-                        <a:cs typeface="Times New Roman"/>
-                      </a:endParaRPr>
                     </a:p>
                   </a:txBody>
                   <a:tcPr marL="68580" marR="68580" marT="0" marB="0">
@@ -6879,22 +6846,22 @@
                         <a:defRPr/>
                       </a:pPr>
                       <a:r>
-                        <a:rPr lang="en-CA" sz="1100" dirty="0" smtClean="0">
+                        <a:rPr lang="en-CA" sz="1100" dirty="0">
                           <a:latin typeface="Calibri"/>
                           <a:ea typeface="Calibri"/>
                           <a:cs typeface="Times New Roman"/>
                         </a:rPr>
-                        <a:t>bitmap</a:t>
+                        <a:t>Bitmap</a:t>
                       </a:r>
                       <a:r>
-                        <a:rPr lang="en-CA" sz="1100" baseline="0" dirty="0" smtClean="0">
+                        <a:rPr lang="en-CA" sz="1100" baseline="0" dirty="0">
                           <a:latin typeface="Calibri"/>
                           <a:ea typeface="Calibri"/>
                           <a:cs typeface="Times New Roman"/>
                         </a:rPr>
                         <a:t> shadows</a:t>
                       </a:r>
-                      <a:endParaRPr lang="en-CA" sz="1100" dirty="0" smtClean="0">
+                      <a:endParaRPr lang="en-CA" sz="1100" dirty="0">
                         <a:latin typeface="Calibri"/>
                         <a:ea typeface="Calibri"/>
                         <a:cs typeface="Times New Roman"/>
@@ -6945,17 +6912,82 @@
                 </a:tc>
                 <a:extLst>
                   <a:ext uri="{0D108BD9-81ED-4DB2-BD59-A6C34878D82A}">
-                    <a16:rowId xmlns="" xmlns:a16="http://schemas.microsoft.com/office/drawing/2014/main" val="10007"/>
+                    <a16:rowId xmlns:a16="http://schemas.microsoft.com/office/drawing/2014/main" val="10007"/>
                   </a:ext>
                 </a:extLst>
               </a:tr>
-              <a:tr h="139924">
+              <a:tr h="187041">
                 <a:tc>
                   <a:txBody>
                     <a:bodyPr/>
                     <a:lstStyle/>
                     <a:p>
-                      <a:pPr marL="0" marR="0" indent="0" algn="ctr" defTabSz="914400" rtl="0" eaLnBrk="1" fontAlgn="auto" latinLnBrk="0" hangingPunct="1">
+                      <a:pPr algn="ctr">
+                        <a:lnSpc>
+                          <a:spcPct val="115000"/>
+                        </a:lnSpc>
+                        <a:spcAft>
+                          <a:spcPts val="0"/>
+                        </a:spcAft>
+                      </a:pPr>
+                      <a:r>
+                        <a:rPr lang="en-CA" sz="1100" dirty="0">
+                          <a:latin typeface="Calibri"/>
+                          <a:ea typeface="Calibri"/>
+                          <a:cs typeface="Times New Roman"/>
+                        </a:rPr>
+                        <a:t>Week 11</a:t>
+                      </a:r>
+                    </a:p>
+                  </a:txBody>
+                  <a:tcPr marL="68580" marR="68580" marT="0" marB="0">
+                    <a:lnL w="12700" cap="flat" cmpd="sng" algn="ctr">
+                      <a:solidFill>
+                        <a:srgbClr val="000000"/>
+                      </a:solidFill>
+                      <a:prstDash val="solid"/>
+                      <a:round/>
+                      <a:headEnd type="none" w="med" len="med"/>
+                      <a:tailEnd type="none" w="med" len="med"/>
+                    </a:lnL>
+                    <a:lnR w="12700" cap="flat" cmpd="sng" algn="ctr">
+                      <a:solidFill>
+                        <a:srgbClr val="000000"/>
+                      </a:solidFill>
+                      <a:prstDash val="solid"/>
+                      <a:round/>
+                      <a:headEnd type="none" w="med" len="med"/>
+                      <a:tailEnd type="none" w="med" len="med"/>
+                    </a:lnR>
+                    <a:lnT w="12700" cap="flat" cmpd="sng" algn="ctr">
+                      <a:solidFill>
+                        <a:srgbClr val="000000"/>
+                      </a:solidFill>
+                      <a:prstDash val="solid"/>
+                      <a:round/>
+                      <a:headEnd type="none" w="med" len="med"/>
+                      <a:tailEnd type="none" w="med" len="med"/>
+                    </a:lnT>
+                    <a:lnB w="12700" cap="flat" cmpd="sng" algn="ctr">
+                      <a:solidFill>
+                        <a:srgbClr val="000000"/>
+                      </a:solidFill>
+                      <a:prstDash val="solid"/>
+                      <a:round/>
+                      <a:headEnd type="none" w="med" len="med"/>
+                      <a:tailEnd type="none" w="med" len="med"/>
+                    </a:lnB>
+                    <a:solidFill>
+                      <a:srgbClr val="FFFFCC"/>
+                    </a:solidFill>
+                  </a:tcPr>
+                </a:tc>
+                <a:tc>
+                  <a:txBody>
+                    <a:bodyPr/>
+                    <a:lstStyle/>
+                    <a:p>
+                      <a:pPr marL="0" marR="0" lvl="0" indent="0" algn="l" defTabSz="914400" rtl="0" eaLnBrk="1" fontAlgn="auto" latinLnBrk="0" hangingPunct="1">
                         <a:lnSpc>
                           <a:spcPct val="115000"/>
                         </a:lnSpc>
@@ -6973,18 +7005,98 @@
                         <a:defRPr/>
                       </a:pPr>
                       <a:r>
-                        <a:rPr lang="en-CA" sz="1100" dirty="0" smtClean="0">
+                        <a:rPr lang="en-CA" sz="1100" dirty="0">
                           <a:latin typeface="Calibri"/>
                           <a:ea typeface="Calibri"/>
                           <a:cs typeface="Times New Roman"/>
                         </a:rPr>
-                        <a:t>Week 9</a:t>
+                        <a:t>Decals; fur, hair, and grass; Geometry</a:t>
+                      </a:r>
+                      <a:r>
+                        <a:rPr lang="en-CA" sz="1100" baseline="0" dirty="0">
+                          <a:latin typeface="Calibri"/>
+                          <a:ea typeface="Calibri"/>
+                          <a:cs typeface="Times New Roman"/>
+                        </a:rPr>
+                        <a:t> shader: dynamic cube map update</a:t>
                       </a:r>
                       <a:endParaRPr lang="en-CA" sz="1100" dirty="0">
                         <a:latin typeface="Calibri"/>
                         <a:ea typeface="Calibri"/>
                         <a:cs typeface="Times New Roman"/>
                       </a:endParaRPr>
+                    </a:p>
+                  </a:txBody>
+                  <a:tcPr marL="68580" marR="68580" marT="0" marB="0">
+                    <a:lnL w="12700" cap="flat" cmpd="sng" algn="ctr">
+                      <a:solidFill>
+                        <a:srgbClr val="000000"/>
+                      </a:solidFill>
+                      <a:prstDash val="solid"/>
+                      <a:round/>
+                      <a:headEnd type="none" w="med" len="med"/>
+                      <a:tailEnd type="none" w="med" len="med"/>
+                    </a:lnL>
+                    <a:lnR w="12700" cap="flat" cmpd="sng" algn="ctr">
+                      <a:solidFill>
+                        <a:srgbClr val="000000"/>
+                      </a:solidFill>
+                      <a:prstDash val="solid"/>
+                      <a:round/>
+                      <a:headEnd type="none" w="med" len="med"/>
+                      <a:tailEnd type="none" w="med" len="med"/>
+                    </a:lnR>
+                    <a:lnT w="12700" cap="flat" cmpd="sng" algn="ctr">
+                      <a:solidFill>
+                        <a:srgbClr val="000000"/>
+                      </a:solidFill>
+                      <a:prstDash val="solid"/>
+                      <a:round/>
+                      <a:headEnd type="none" w="med" len="med"/>
+                      <a:tailEnd type="none" w="med" len="med"/>
+                    </a:lnT>
+                    <a:lnB w="12700" cap="flat" cmpd="sng" algn="ctr">
+                      <a:solidFill>
+                        <a:srgbClr val="000000"/>
+                      </a:solidFill>
+                      <a:prstDash val="solid"/>
+                      <a:round/>
+                      <a:headEnd type="none" w="med" len="med"/>
+                      <a:tailEnd type="none" w="med" len="med"/>
+                    </a:lnB>
+                    <a:solidFill>
+                      <a:srgbClr val="FFFFCC"/>
+                    </a:solidFill>
+                  </a:tcPr>
+                </a:tc>
+                <a:extLst>
+                  <a:ext uri="{0D108BD9-81ED-4DB2-BD59-A6C34878D82A}">
+                    <a16:rowId xmlns:a16="http://schemas.microsoft.com/office/drawing/2014/main" val="10009"/>
+                  </a:ext>
+                </a:extLst>
+              </a:tr>
+              <a:tr h="161676">
+                <a:tc>
+                  <a:txBody>
+                    <a:bodyPr/>
+                    <a:lstStyle/>
+                    <a:p>
+                      <a:pPr algn="ctr">
+                        <a:lnSpc>
+                          <a:spcPct val="115000"/>
+                        </a:lnSpc>
+                        <a:spcAft>
+                          <a:spcPts val="0"/>
+                        </a:spcAft>
+                      </a:pPr>
+                      <a:r>
+                        <a:rPr lang="en-CA" sz="1100" dirty="0">
+                          <a:latin typeface="Calibri"/>
+                          <a:ea typeface="Calibri"/>
+                          <a:cs typeface="Times New Roman"/>
+                        </a:rPr>
+                        <a:t>Week 13</a:t>
+                      </a:r>
                     </a:p>
                   </a:txBody>
                   <a:tcPr marL="68580" marR="68580" marT="0" marB="0">
@@ -7052,13 +7164,42 @@
                         <a:defRPr/>
                       </a:pPr>
                       <a:r>
-                        <a:rPr lang="en-CA" sz="1100" dirty="0" smtClean="0">
+                        <a:rPr lang="en-CA" sz="1100" dirty="0">
                           <a:latin typeface="Calibri"/>
                           <a:ea typeface="Calibri"/>
                           <a:cs typeface="Times New Roman"/>
                         </a:rPr>
-                        <a:t>Decals; fur, hair, and grass</a:t>
+                        <a:t>Compute </a:t>
                       </a:r>
+                      <a:r>
+                        <a:rPr lang="en-CA" sz="1100" dirty="0" err="1">
+                          <a:latin typeface="Calibri"/>
+                          <a:ea typeface="Calibri"/>
+                          <a:cs typeface="Times New Roman"/>
+                        </a:rPr>
+                        <a:t>Shader</a:t>
+                      </a:r>
+                      <a:r>
+                        <a:rPr lang="en-CA" sz="1100" dirty="0">
+                          <a:latin typeface="Calibri"/>
+                          <a:ea typeface="Calibri"/>
+                          <a:cs typeface="Times New Roman"/>
+                        </a:rPr>
+                        <a:t>:</a:t>
+                      </a:r>
+                      <a:r>
+                        <a:rPr lang="en-CA" sz="1100" baseline="0" dirty="0">
+                          <a:latin typeface="Calibri"/>
+                          <a:ea typeface="Calibri"/>
+                          <a:cs typeface="Times New Roman"/>
+                        </a:rPr>
+                        <a:t> non-graphics uses, “Forward+” deferred rendering alternative, etc.</a:t>
+                      </a:r>
+                      <a:endParaRPr lang="en-CA" sz="1100" dirty="0">
+                        <a:latin typeface="Calibri"/>
+                        <a:ea typeface="Calibri"/>
+                        <a:cs typeface="Times New Roman"/>
+                      </a:endParaRPr>
                     </a:p>
                   </a:txBody>
                   <a:tcPr marL="68580" marR="68580" marT="0" marB="0">
@@ -7105,11 +7246,11 @@
                 </a:tc>
                 <a:extLst>
                   <a:ext uri="{0D108BD9-81ED-4DB2-BD59-A6C34878D82A}">
-                    <a16:rowId xmlns="" xmlns:a16="http://schemas.microsoft.com/office/drawing/2014/main" val="10008"/>
+                    <a16:rowId xmlns:a16="http://schemas.microsoft.com/office/drawing/2014/main" val="10010"/>
                   </a:ext>
                 </a:extLst>
               </a:tr>
-              <a:tr h="187041">
+              <a:tr h="132206">
                 <a:tc>
                   <a:txBody>
                     <a:bodyPr/>
@@ -7129,21 +7270,8 @@
                           <a:ea typeface="Calibri"/>
                           <a:cs typeface="Times New Roman"/>
                         </a:rPr>
-                        <a:t>Week </a:t>
+                        <a:t>Week 14</a:t>
                       </a:r>
-                      <a:r>
-                        <a:rPr lang="en-CA" sz="1100" dirty="0" smtClean="0">
-                          <a:latin typeface="Calibri"/>
-                          <a:ea typeface="Calibri"/>
-                          <a:cs typeface="Times New Roman"/>
-                        </a:rPr>
-                        <a:t>11</a:t>
-                      </a:r>
-                      <a:endParaRPr lang="en-CA" sz="1100" dirty="0">
-                        <a:latin typeface="Calibri"/>
-                        <a:ea typeface="Calibri"/>
-                        <a:cs typeface="Times New Roman"/>
-                      </a:endParaRPr>
                     </a:p>
                   </a:txBody>
                   <a:tcPr marL="68580" marR="68580" marT="0" marB="0">
@@ -7211,38 +7339,22 @@
                         <a:defRPr/>
                       </a:pPr>
                       <a:r>
-                        <a:rPr lang="en-CA" sz="1100" dirty="0" smtClean="0">
+                        <a:rPr lang="en-CA" sz="1100" dirty="0">
                           <a:latin typeface="Calibri"/>
                           <a:ea typeface="Calibri"/>
                           <a:cs typeface="Times New Roman"/>
                         </a:rPr>
-                        <a:t>Geometry</a:t>
+                        <a:t>Additional</a:t>
                       </a:r>
                       <a:r>
-                        <a:rPr lang="en-CA" sz="1100" baseline="0" dirty="0" smtClean="0">
+                        <a:rPr lang="en-CA" sz="1100" baseline="0" dirty="0">
                           <a:latin typeface="Calibri"/>
                           <a:ea typeface="Calibri"/>
                           <a:cs typeface="Times New Roman"/>
                         </a:rPr>
-                        <a:t> </a:t>
+                        <a:t> topics as time permits: High Dynamic Range (HDR), level of detail generation</a:t>
                       </a:r>
-                      <a:r>
-                        <a:rPr lang="en-CA" sz="1100" baseline="0" dirty="0" err="1" smtClean="0">
-                          <a:latin typeface="Calibri"/>
-                          <a:ea typeface="Calibri"/>
-                          <a:cs typeface="Times New Roman"/>
-                        </a:rPr>
-                        <a:t>shader</a:t>
-                      </a:r>
-                      <a:r>
-                        <a:rPr lang="en-CA" sz="1100" baseline="0" dirty="0" smtClean="0">
-                          <a:latin typeface="Calibri"/>
-                          <a:ea typeface="Calibri"/>
-                          <a:cs typeface="Times New Roman"/>
-                        </a:rPr>
-                        <a:t>: dynamic cube map update</a:t>
-                      </a:r>
-                      <a:endParaRPr lang="en-CA" sz="1100" dirty="0" smtClean="0">
+                      <a:endParaRPr lang="en-CA" sz="1100" dirty="0">
                         <a:latin typeface="Calibri"/>
                         <a:ea typeface="Calibri"/>
                         <a:cs typeface="Times New Roman"/>
@@ -7293,11 +7405,11 @@
                 </a:tc>
                 <a:extLst>
                   <a:ext uri="{0D108BD9-81ED-4DB2-BD59-A6C34878D82A}">
-                    <a16:rowId xmlns="" xmlns:a16="http://schemas.microsoft.com/office/drawing/2014/main" val="10009"/>
+                    <a16:rowId xmlns:a16="http://schemas.microsoft.com/office/drawing/2014/main" val="10011"/>
                   </a:ext>
                 </a:extLst>
               </a:tr>
-              <a:tr h="161676">
+              <a:tr h="132206">
                 <a:tc>
                   <a:txBody>
                     <a:bodyPr/>
@@ -7317,7 +7429,7 @@
                           <a:ea typeface="Calibri"/>
                           <a:cs typeface="Times New Roman"/>
                         </a:rPr>
-                        <a:t>Week 13</a:t>
+                        <a:t>“Week 15”</a:t>
                       </a:r>
                     </a:p>
                   </a:txBody>
@@ -7386,346 +7498,7 @@
                         <a:defRPr/>
                       </a:pPr>
                       <a:r>
-                        <a:rPr lang="en-CA" sz="1100" dirty="0" smtClean="0">
-                          <a:latin typeface="Calibri"/>
-                          <a:ea typeface="Calibri"/>
-                          <a:cs typeface="Times New Roman"/>
-                        </a:rPr>
-                        <a:t>Compute </a:t>
-                      </a:r>
-                      <a:r>
-                        <a:rPr lang="en-CA" sz="1100" dirty="0" err="1" smtClean="0">
-                          <a:latin typeface="Calibri"/>
-                          <a:ea typeface="Calibri"/>
-                          <a:cs typeface="Times New Roman"/>
-                        </a:rPr>
-                        <a:t>Shader</a:t>
-                      </a:r>
-                      <a:r>
-                        <a:rPr lang="en-CA" sz="1100" dirty="0" smtClean="0">
-                          <a:latin typeface="Calibri"/>
-                          <a:ea typeface="Calibri"/>
-                          <a:cs typeface="Times New Roman"/>
-                        </a:rPr>
-                        <a:t>:</a:t>
-                      </a:r>
-                      <a:r>
-                        <a:rPr lang="en-CA" sz="1100" baseline="0" dirty="0" smtClean="0">
-                          <a:latin typeface="Calibri"/>
-                          <a:ea typeface="Calibri"/>
-                          <a:cs typeface="Times New Roman"/>
-                        </a:rPr>
-                        <a:t> non-graphics uses, “Forward+” deferred rendering alternative, etc.</a:t>
-                      </a:r>
-                      <a:endParaRPr lang="en-CA" sz="1100" dirty="0" smtClean="0">
-                        <a:latin typeface="Calibri"/>
-                        <a:ea typeface="Calibri"/>
-                        <a:cs typeface="Times New Roman"/>
-                      </a:endParaRPr>
-                    </a:p>
-                  </a:txBody>
-                  <a:tcPr marL="68580" marR="68580" marT="0" marB="0">
-                    <a:lnL w="12700" cap="flat" cmpd="sng" algn="ctr">
-                      <a:solidFill>
-                        <a:srgbClr val="000000"/>
-                      </a:solidFill>
-                      <a:prstDash val="solid"/>
-                      <a:round/>
-                      <a:headEnd type="none" w="med" len="med"/>
-                      <a:tailEnd type="none" w="med" len="med"/>
-                    </a:lnL>
-                    <a:lnR w="12700" cap="flat" cmpd="sng" algn="ctr">
-                      <a:solidFill>
-                        <a:srgbClr val="000000"/>
-                      </a:solidFill>
-                      <a:prstDash val="solid"/>
-                      <a:round/>
-                      <a:headEnd type="none" w="med" len="med"/>
-                      <a:tailEnd type="none" w="med" len="med"/>
-                    </a:lnR>
-                    <a:lnT w="12700" cap="flat" cmpd="sng" algn="ctr">
-                      <a:solidFill>
-                        <a:srgbClr val="000000"/>
-                      </a:solidFill>
-                      <a:prstDash val="solid"/>
-                      <a:round/>
-                      <a:headEnd type="none" w="med" len="med"/>
-                      <a:tailEnd type="none" w="med" len="med"/>
-                    </a:lnT>
-                    <a:lnB w="12700" cap="flat" cmpd="sng" algn="ctr">
-                      <a:solidFill>
-                        <a:srgbClr val="000000"/>
-                      </a:solidFill>
-                      <a:prstDash val="solid"/>
-                      <a:round/>
-                      <a:headEnd type="none" w="med" len="med"/>
-                      <a:tailEnd type="none" w="med" len="med"/>
-                    </a:lnB>
-                    <a:solidFill>
-                      <a:srgbClr val="FFFFCC"/>
-                    </a:solidFill>
-                  </a:tcPr>
-                </a:tc>
-                <a:extLst>
-                  <a:ext uri="{0D108BD9-81ED-4DB2-BD59-A6C34878D82A}">
-                    <a16:rowId xmlns="" xmlns:a16="http://schemas.microsoft.com/office/drawing/2014/main" val="10010"/>
-                  </a:ext>
-                </a:extLst>
-              </a:tr>
-              <a:tr h="132206">
-                <a:tc>
-                  <a:txBody>
-                    <a:bodyPr/>
-                    <a:lstStyle/>
-                    <a:p>
-                      <a:pPr algn="ctr">
-                        <a:lnSpc>
-                          <a:spcPct val="115000"/>
-                        </a:lnSpc>
-                        <a:spcAft>
-                          <a:spcPts val="0"/>
-                        </a:spcAft>
-                      </a:pPr>
-                      <a:r>
                         <a:rPr lang="en-CA" sz="1100" dirty="0">
-                          <a:latin typeface="Calibri"/>
-                          <a:ea typeface="Calibri"/>
-                          <a:cs typeface="Times New Roman"/>
-                        </a:rPr>
-                        <a:t>Week 14</a:t>
-                      </a:r>
-                    </a:p>
-                  </a:txBody>
-                  <a:tcPr marL="68580" marR="68580" marT="0" marB="0">
-                    <a:lnL w="12700" cap="flat" cmpd="sng" algn="ctr">
-                      <a:solidFill>
-                        <a:srgbClr val="000000"/>
-                      </a:solidFill>
-                      <a:prstDash val="solid"/>
-                      <a:round/>
-                      <a:headEnd type="none" w="med" len="med"/>
-                      <a:tailEnd type="none" w="med" len="med"/>
-                    </a:lnL>
-                    <a:lnR w="12700" cap="flat" cmpd="sng" algn="ctr">
-                      <a:solidFill>
-                        <a:srgbClr val="000000"/>
-                      </a:solidFill>
-                      <a:prstDash val="solid"/>
-                      <a:round/>
-                      <a:headEnd type="none" w="med" len="med"/>
-                      <a:tailEnd type="none" w="med" len="med"/>
-                    </a:lnR>
-                    <a:lnT w="12700" cap="flat" cmpd="sng" algn="ctr">
-                      <a:solidFill>
-                        <a:srgbClr val="000000"/>
-                      </a:solidFill>
-                      <a:prstDash val="solid"/>
-                      <a:round/>
-                      <a:headEnd type="none" w="med" len="med"/>
-                      <a:tailEnd type="none" w="med" len="med"/>
-                    </a:lnT>
-                    <a:lnB w="12700" cap="flat" cmpd="sng" algn="ctr">
-                      <a:solidFill>
-                        <a:srgbClr val="000000"/>
-                      </a:solidFill>
-                      <a:prstDash val="solid"/>
-                      <a:round/>
-                      <a:headEnd type="none" w="med" len="med"/>
-                      <a:tailEnd type="none" w="med" len="med"/>
-                    </a:lnB>
-                    <a:solidFill>
-                      <a:srgbClr val="FFFFCC"/>
-                    </a:solidFill>
-                  </a:tcPr>
-                </a:tc>
-                <a:tc>
-                  <a:txBody>
-                    <a:bodyPr/>
-                    <a:lstStyle/>
-                    <a:p>
-                      <a:pPr marL="0" marR="0" indent="0" algn="l" defTabSz="914400" rtl="0" eaLnBrk="1" fontAlgn="auto" latinLnBrk="0" hangingPunct="1">
-                        <a:lnSpc>
-                          <a:spcPct val="115000"/>
-                        </a:lnSpc>
-                        <a:spcBef>
-                          <a:spcPts val="0"/>
-                        </a:spcBef>
-                        <a:spcAft>
-                          <a:spcPts val="0"/>
-                        </a:spcAft>
-                        <a:buClrTx/>
-                        <a:buSzTx/>
-                        <a:buFontTx/>
-                        <a:buNone/>
-                        <a:tabLst/>
-                        <a:defRPr/>
-                      </a:pPr>
-                      <a:r>
-                        <a:rPr lang="en-CA" sz="1100" dirty="0" smtClean="0">
-                          <a:latin typeface="Calibri"/>
-                          <a:ea typeface="Calibri"/>
-                          <a:cs typeface="Times New Roman"/>
-                        </a:rPr>
-                        <a:t>Additional</a:t>
-                      </a:r>
-                      <a:r>
-                        <a:rPr lang="en-CA" sz="1100" baseline="0" dirty="0" smtClean="0">
-                          <a:latin typeface="Calibri"/>
-                          <a:ea typeface="Calibri"/>
-                          <a:cs typeface="Times New Roman"/>
-                        </a:rPr>
-                        <a:t> topics as time permits: High Dynamic Range (HDR), level of detail generation</a:t>
-                      </a:r>
-                      <a:endParaRPr lang="en-CA" sz="1100" dirty="0">
-                        <a:latin typeface="Calibri"/>
-                        <a:ea typeface="Calibri"/>
-                        <a:cs typeface="Times New Roman"/>
-                      </a:endParaRPr>
-                    </a:p>
-                  </a:txBody>
-                  <a:tcPr marL="68580" marR="68580" marT="0" marB="0">
-                    <a:lnL w="12700" cap="flat" cmpd="sng" algn="ctr">
-                      <a:solidFill>
-                        <a:srgbClr val="000000"/>
-                      </a:solidFill>
-                      <a:prstDash val="solid"/>
-                      <a:round/>
-                      <a:headEnd type="none" w="med" len="med"/>
-                      <a:tailEnd type="none" w="med" len="med"/>
-                    </a:lnL>
-                    <a:lnR w="12700" cap="flat" cmpd="sng" algn="ctr">
-                      <a:solidFill>
-                        <a:srgbClr val="000000"/>
-                      </a:solidFill>
-                      <a:prstDash val="solid"/>
-                      <a:round/>
-                      <a:headEnd type="none" w="med" len="med"/>
-                      <a:tailEnd type="none" w="med" len="med"/>
-                    </a:lnR>
-                    <a:lnT w="12700" cap="flat" cmpd="sng" algn="ctr">
-                      <a:solidFill>
-                        <a:srgbClr val="000000"/>
-                      </a:solidFill>
-                      <a:prstDash val="solid"/>
-                      <a:round/>
-                      <a:headEnd type="none" w="med" len="med"/>
-                      <a:tailEnd type="none" w="med" len="med"/>
-                    </a:lnT>
-                    <a:lnB w="12700" cap="flat" cmpd="sng" algn="ctr">
-                      <a:solidFill>
-                        <a:srgbClr val="000000"/>
-                      </a:solidFill>
-                      <a:prstDash val="solid"/>
-                      <a:round/>
-                      <a:headEnd type="none" w="med" len="med"/>
-                      <a:tailEnd type="none" w="med" len="med"/>
-                    </a:lnB>
-                    <a:solidFill>
-                      <a:srgbClr val="FFFFCC"/>
-                    </a:solidFill>
-                  </a:tcPr>
-                </a:tc>
-                <a:extLst>
-                  <a:ext uri="{0D108BD9-81ED-4DB2-BD59-A6C34878D82A}">
-                    <a16:rowId xmlns="" xmlns:a16="http://schemas.microsoft.com/office/drawing/2014/main" val="10011"/>
-                  </a:ext>
-                </a:extLst>
-              </a:tr>
-              <a:tr h="132206">
-                <a:tc>
-                  <a:txBody>
-                    <a:bodyPr/>
-                    <a:lstStyle/>
-                    <a:p>
-                      <a:pPr algn="ctr">
-                        <a:lnSpc>
-                          <a:spcPct val="115000"/>
-                        </a:lnSpc>
-                        <a:spcAft>
-                          <a:spcPts val="0"/>
-                        </a:spcAft>
-                      </a:pPr>
-                      <a:r>
-                        <a:rPr lang="en-CA" sz="1100" dirty="0" smtClean="0">
-                          <a:latin typeface="Calibri"/>
-                          <a:ea typeface="Calibri"/>
-                          <a:cs typeface="Times New Roman"/>
-                        </a:rPr>
-                        <a:t>“Week 15”</a:t>
-                      </a:r>
-                      <a:endParaRPr lang="en-CA" sz="1100" dirty="0">
-                        <a:latin typeface="Calibri"/>
-                        <a:ea typeface="Calibri"/>
-                        <a:cs typeface="Times New Roman"/>
-                      </a:endParaRPr>
-                    </a:p>
-                  </a:txBody>
-                  <a:tcPr marL="68580" marR="68580" marT="0" marB="0">
-                    <a:lnL w="12700" cap="flat" cmpd="sng" algn="ctr">
-                      <a:solidFill>
-                        <a:srgbClr val="000000"/>
-                      </a:solidFill>
-                      <a:prstDash val="solid"/>
-                      <a:round/>
-                      <a:headEnd type="none" w="med" len="med"/>
-                      <a:tailEnd type="none" w="med" len="med"/>
-                    </a:lnL>
-                    <a:lnR w="12700" cap="flat" cmpd="sng" algn="ctr">
-                      <a:solidFill>
-                        <a:srgbClr val="000000"/>
-                      </a:solidFill>
-                      <a:prstDash val="solid"/>
-                      <a:round/>
-                      <a:headEnd type="none" w="med" len="med"/>
-                      <a:tailEnd type="none" w="med" len="med"/>
-                    </a:lnR>
-                    <a:lnT w="12700" cap="flat" cmpd="sng" algn="ctr">
-                      <a:solidFill>
-                        <a:srgbClr val="000000"/>
-                      </a:solidFill>
-                      <a:prstDash val="solid"/>
-                      <a:round/>
-                      <a:headEnd type="none" w="med" len="med"/>
-                      <a:tailEnd type="none" w="med" len="med"/>
-                    </a:lnT>
-                    <a:lnB w="12700" cap="flat" cmpd="sng" algn="ctr">
-                      <a:solidFill>
-                        <a:srgbClr val="000000"/>
-                      </a:solidFill>
-                      <a:prstDash val="solid"/>
-                      <a:round/>
-                      <a:headEnd type="none" w="med" len="med"/>
-                      <a:tailEnd type="none" w="med" len="med"/>
-                    </a:lnB>
-                    <a:solidFill>
-                      <a:srgbClr val="FFFFCC"/>
-                    </a:solidFill>
-                  </a:tcPr>
-                </a:tc>
-                <a:tc>
-                  <a:txBody>
-                    <a:bodyPr/>
-                    <a:lstStyle/>
-                    <a:p>
-                      <a:pPr marL="0" marR="0" indent="0" algn="l" defTabSz="914400" rtl="0" eaLnBrk="1" fontAlgn="auto" latinLnBrk="0" hangingPunct="1">
-                        <a:lnSpc>
-                          <a:spcPct val="115000"/>
-                        </a:lnSpc>
-                        <a:spcBef>
-                          <a:spcPts val="0"/>
-                        </a:spcBef>
-                        <a:spcAft>
-                          <a:spcPts val="0"/>
-                        </a:spcAft>
-                        <a:buClrTx/>
-                        <a:buSzTx/>
-                        <a:buFontTx/>
-                        <a:buNone/>
-                        <a:tabLst/>
-                        <a:defRPr/>
-                      </a:pPr>
-                      <a:r>
-                        <a:rPr lang="en-CA" sz="1100" dirty="0" smtClean="0">
                           <a:latin typeface="Calibri"/>
                           <a:ea typeface="Calibri"/>
                           <a:cs typeface="Times New Roman"/>
@@ -7733,7 +7506,7 @@
                         <a:t>Exam</a:t>
                       </a:r>
                       <a:r>
-                        <a:rPr lang="en-CA" sz="1100" baseline="0" dirty="0" smtClean="0">
+                        <a:rPr lang="en-CA" sz="1100" baseline="0" dirty="0">
                           <a:latin typeface="Calibri"/>
                           <a:ea typeface="Calibri"/>
                           <a:cs typeface="Times New Roman"/>
@@ -7789,6 +7562,11 @@
                     </a:solidFill>
                   </a:tcPr>
                 </a:tc>
+                <a:extLst>
+                  <a:ext uri="{0D108BD9-81ED-4DB2-BD59-A6C34878D82A}">
+                    <a16:rowId xmlns:a16="http://schemas.microsoft.com/office/drawing/2014/main" val="10014"/>
+                  </a:ext>
+                </a:extLst>
               </a:tr>
             </a:tbl>
           </a:graphicData>
@@ -7817,20 +7595,19 @@
           <a:lstStyle/>
           <a:p>
             <a:r>
-              <a:rPr lang="en-CA" dirty="0" smtClean="0"/>
+              <a:rPr lang="en-CA" dirty="0"/>
               <a:t>INFO-6020 Graphics 2, Winter 2023, </a:t>
             </a:r>
             <a:r>
-              <a:rPr lang="en-CA" dirty="0" smtClean="0">
+              <a:rPr lang="en-CA" dirty="0">
                 <a:hlinkClick r:id="rId2"/>
               </a:rPr>
               <a:t>mfeeney@fanshawec.ca</a:t>
             </a:r>
             <a:r>
-              <a:rPr lang="en-CA" dirty="0" smtClean="0"/>
+              <a:rPr lang="en-CA" dirty="0"/>
               <a:t>, Michael Feeney</a:t>
             </a:r>
-            <a:endParaRPr lang="en-CA" dirty="0"/>
           </a:p>
         </p:txBody>
       </p:sp>
@@ -7960,10 +7737,9 @@
           <a:lstStyle/>
           <a:p>
             <a:r>
-              <a:rPr lang="en-CA" dirty="0" smtClean="0"/>
+              <a:rPr lang="en-CA" dirty="0"/>
               <a:t>Environment</a:t>
             </a:r>
-            <a:endParaRPr lang="en-CA" dirty="0"/>
           </a:p>
         </p:txBody>
       </p:sp>
@@ -7985,29 +7761,20 @@
           <a:lstStyle/>
           <a:p>
             <a:r>
-              <a:rPr lang="en-CA" dirty="0" smtClean="0"/>
+              <a:rPr lang="en-CA" dirty="0"/>
               <a:t>C++ (“modern” C++ stuff is frowned upon)</a:t>
             </a:r>
           </a:p>
           <a:p>
             <a:r>
-              <a:rPr lang="en-CA" dirty="0" smtClean="0"/>
-              <a:t>Visual Studio </a:t>
-            </a:r>
-            <a:r>
-              <a:rPr lang="en-CA" dirty="0" smtClean="0"/>
-              <a:t>2019 to 2022</a:t>
-            </a:r>
-            <a:endParaRPr lang="en-CA" dirty="0" smtClean="0"/>
-          </a:p>
-          <a:p>
-            <a:r>
-              <a:rPr lang="en-CA" dirty="0" smtClean="0"/>
-              <a:t>OpenGL </a:t>
-            </a:r>
-            <a:r>
-              <a:rPr lang="en-CA" dirty="0" smtClean="0"/>
-              <a:t>(4.x+)</a:t>
+              <a:rPr lang="en-CA" dirty="0"/>
+              <a:t>Visual Studio 2019 to 2022</a:t>
+            </a:r>
+          </a:p>
+          <a:p>
+            <a:r>
+              <a:rPr lang="en-CA" dirty="0"/>
+              <a:t>OpenGL (4.x+)</a:t>
             </a:r>
           </a:p>
           <a:p>
@@ -8018,20 +7785,13 @@
     </p:spTree>
     <p:extLst>
       <p:ext uri="{BB962C8B-B14F-4D97-AF65-F5344CB8AC3E}">
-        <p14:creationId xmlns="" xmlns:p14="http://schemas.microsoft.com/office/powerpoint/2010/main" val="1483520627"/>
+        <p14:creationId xmlns:p14="http://schemas.microsoft.com/office/powerpoint/2010/main" val="1483520627"/>
       </p:ext>
     </p:extLst>
   </p:cSld>
   <p:clrMapOvr>
     <a:masterClrMapping/>
   </p:clrMapOvr>
-  <p:timing>
-    <p:tnLst>
-      <p:par>
-        <p:cTn id="1" dur="indefinite" restart="never" nodeType="tmRoot"/>
-      </p:par>
-    </p:tnLst>
-  </p:timing>
 </p:sld>
 </file>
 
@@ -8070,10 +7830,9 @@
           <a:lstStyle/>
           <a:p>
             <a:r>
-              <a:rPr lang="en-CA" dirty="0" smtClean="0"/>
+              <a:rPr lang="en-CA" dirty="0"/>
               <a:t>How do I pass?</a:t>
             </a:r>
-            <a:endParaRPr lang="en-CA" dirty="0"/>
           </a:p>
         </p:txBody>
       </p:sp>
@@ -8099,61 +7858,48 @@
               <a:buChar char="•"/>
             </a:pPr>
             <a:r>
-              <a:rPr lang="en-CA" dirty="0" smtClean="0"/>
+              <a:rPr lang="en-CA" dirty="0"/>
               <a:t>60/40  Practical Assignments / Theory Exam</a:t>
             </a:r>
           </a:p>
           <a:p>
             <a:r>
-              <a:rPr lang="en-CA" sz="2600" dirty="0" smtClean="0"/>
-              <a:t>Project #1: 20%</a:t>
-            </a:r>
-          </a:p>
-          <a:p>
-            <a:r>
-              <a:rPr lang="en-CA" sz="2600" dirty="0" smtClean="0"/>
-              <a:t>Game Jam project #2: 20%</a:t>
-            </a:r>
-            <a:endParaRPr lang="en-CA" sz="2600" dirty="0" smtClean="0"/>
-          </a:p>
-          <a:p>
-            <a:r>
-              <a:rPr lang="en-CA" sz="2600" dirty="0" smtClean="0"/>
-              <a:t>Mid-term exam: 30</a:t>
-            </a:r>
-            <a:r>
-              <a:rPr lang="en-CA" sz="2600" dirty="0" smtClean="0"/>
-              <a:t>%</a:t>
-            </a:r>
-          </a:p>
-          <a:p>
-            <a:r>
-              <a:rPr lang="en-CA" sz="2600" dirty="0" smtClean="0"/>
-              <a:t>Final </a:t>
-            </a:r>
-            <a:r>
-              <a:rPr lang="en-CA" sz="2600" dirty="0" smtClean="0"/>
-              <a:t>exam: 30</a:t>
-            </a:r>
-            <a:r>
-              <a:rPr lang="en-CA" sz="2600" dirty="0" smtClean="0"/>
-              <a:t>%  (may be combined with Jam)</a:t>
-            </a:r>
-          </a:p>
-          <a:p>
-            <a:endParaRPr lang="en-CA" sz="2600" dirty="0" smtClean="0"/>
-          </a:p>
-          <a:p>
-            <a:r>
-              <a:rPr lang="en-CA" sz="2600" dirty="0" smtClean="0"/>
+              <a:rPr lang="en-CA" sz="2600" dirty="0"/>
+              <a:t>Project #1: 30%</a:t>
+            </a:r>
+          </a:p>
+          <a:p>
+            <a:r>
+              <a:rPr lang="en-CA" sz="2600" dirty="0"/>
+              <a:t>Game Jam project #2: 30%</a:t>
+            </a:r>
+          </a:p>
+          <a:p>
+            <a:r>
+              <a:rPr lang="en-CA" sz="2600" dirty="0"/>
+              <a:t>Mid-term exam: 20%</a:t>
+            </a:r>
+          </a:p>
+          <a:p>
+            <a:r>
+              <a:rPr lang="en-CA" sz="2600" dirty="0"/>
+              <a:t>Final exam: 20%  (may be combined with Jam)</a:t>
+            </a:r>
+          </a:p>
+          <a:p>
+            <a:endParaRPr lang="en-CA" sz="2600" dirty="0"/>
+          </a:p>
+          <a:p>
+            <a:r>
+              <a:rPr lang="en-CA" sz="2600" dirty="0"/>
               <a:t>You must pass the exam </a:t>
             </a:r>
             <a:r>
-              <a:rPr lang="en-CA" sz="2600" u="sng" dirty="0" smtClean="0"/>
+              <a:rPr lang="en-CA" sz="2600" u="sng" dirty="0"/>
               <a:t>AND</a:t>
             </a:r>
             <a:r>
-              <a:rPr lang="en-CA" sz="2600" dirty="0" smtClean="0"/>
+              <a:rPr lang="en-CA" sz="2600" dirty="0"/>
               <a:t> project portion to pass</a:t>
             </a:r>
           </a:p>
@@ -8165,20 +7911,13 @@
     </p:spTree>
     <p:extLst>
       <p:ext uri="{BB962C8B-B14F-4D97-AF65-F5344CB8AC3E}">
-        <p14:creationId xmlns="" xmlns:p14="http://schemas.microsoft.com/office/powerpoint/2010/main" val="2594262983"/>
+        <p14:creationId xmlns:p14="http://schemas.microsoft.com/office/powerpoint/2010/main" val="2594262983"/>
       </p:ext>
     </p:extLst>
   </p:cSld>
   <p:clrMapOvr>
     <a:masterClrMapping/>
   </p:clrMapOvr>
-  <p:timing>
-    <p:tnLst>
-      <p:par>
-        <p:cTn id="1" dur="indefinite" restart="never" nodeType="tmRoot"/>
-      </p:par>
-    </p:tnLst>
-  </p:timing>
 </p:sld>
 </file>
 
@@ -8264,7 +8003,7 @@
               <a:buChar char="•"/>
             </a:pPr>
             <a:r>
-              <a:rPr lang="en-CA" sz="1200" dirty="0" smtClean="0">
+              <a:rPr lang="en-CA" sz="1200" dirty="0">
                 <a:solidFill>
                   <a:schemeClr val="bg1"/>
                 </a:solidFill>
@@ -8274,7 +8013,7 @@
               <a:t> Aug. 2014: 4.5 added DX11 extensions   </a:t>
             </a:r>
             <a:br>
-              <a:rPr lang="en-CA" sz="1200" dirty="0" smtClean="0">
+              <a:rPr lang="en-CA" sz="1200" dirty="0">
                 <a:solidFill>
                   <a:schemeClr val="bg1"/>
                 </a:solidFill>
@@ -8283,7 +8022,7 @@
               </a:rPr>
             </a:br>
             <a:r>
-              <a:rPr lang="en-CA" sz="1200" dirty="0" smtClean="0">
+              <a:rPr lang="en-CA" sz="1200" dirty="0">
                 <a:solidFill>
                   <a:schemeClr val="bg1"/>
                 </a:solidFill>
@@ -8299,7 +8038,7 @@
               <a:buChar char="•"/>
             </a:pPr>
             <a:r>
-              <a:rPr lang="en-CA" sz="1200" dirty="0" smtClean="0">
+              <a:rPr lang="en-CA" sz="1200" dirty="0">
                 <a:solidFill>
                   <a:schemeClr val="bg1"/>
                 </a:solidFill>
@@ -8309,7 +8048,7 @@
               <a:t> July, 2017: 4.6 added SPIR-V </a:t>
             </a:r>
             <a:br>
-              <a:rPr lang="en-CA" sz="1200" dirty="0" smtClean="0">
+              <a:rPr lang="en-CA" sz="1200" dirty="0">
                 <a:solidFill>
                   <a:schemeClr val="bg1"/>
                 </a:solidFill>
@@ -8318,7 +8057,7 @@
               </a:rPr>
             </a:br>
             <a:r>
-              <a:rPr lang="en-CA" sz="1200" dirty="0" smtClean="0">
+              <a:rPr lang="en-CA" sz="1200" dirty="0">
                 <a:solidFill>
                   <a:schemeClr val="bg1"/>
                 </a:solidFill>
@@ -8328,7 +8067,7 @@
               <a:t>  (what </a:t>
             </a:r>
             <a:r>
-              <a:rPr lang="en-CA" sz="1200" dirty="0" err="1" smtClean="0">
+              <a:rPr lang="en-CA" sz="1200" dirty="0" err="1">
                 <a:solidFill>
                   <a:schemeClr val="bg1"/>
                 </a:solidFill>
@@ -8338,7 +8077,7 @@
               <a:t>Vulkan</a:t>
             </a:r>
             <a:r>
-              <a:rPr lang="en-CA" sz="1200" dirty="0" smtClean="0">
+              <a:rPr lang="en-CA" sz="1200" dirty="0">
                 <a:solidFill>
                   <a:schemeClr val="bg1"/>
                 </a:solidFill>
@@ -8347,13 +8086,6 @@
               </a:rPr>
               <a:t> uses)</a:t>
             </a:r>
-            <a:endParaRPr lang="en-CA" sz="1200" dirty="0">
-              <a:solidFill>
-                <a:schemeClr val="bg1"/>
-              </a:solidFill>
-              <a:latin typeface="Arial" pitchFamily="34" charset="0"/>
-              <a:cs typeface="Arial" pitchFamily="34" charset="0"/>
-            </a:endParaRPr>
           </a:p>
         </p:txBody>
       </p:sp>
@@ -8362,13 +8094,6 @@
   <p:clrMapOvr>
     <a:masterClrMapping/>
   </p:clrMapOvr>
-  <p:timing>
-    <p:tnLst>
-      <p:par>
-        <p:cTn id="1" dur="indefinite" restart="never" nodeType="tmRoot"/>
-      </p:par>
-    </p:tnLst>
-  </p:timing>
 </p:sld>
 </file>
 

</xml_diff>